<commit_message>
Add new figure for OOP
</commit_message>
<xml_diff>
--- a/AIforWeather_ch02.pptx
+++ b/AIforWeather_ch02.pptx
@@ -8,31 +8,32 @@
     <p:sldId id="256" r:id="rId2"/>
     <p:sldId id="257" r:id="rId3"/>
     <p:sldId id="259" r:id="rId4"/>
-    <p:sldId id="260" r:id="rId5"/>
-    <p:sldId id="273" r:id="rId6"/>
-    <p:sldId id="276" r:id="rId7"/>
-    <p:sldId id="293" r:id="rId8"/>
-    <p:sldId id="277" r:id="rId9"/>
-    <p:sldId id="263" r:id="rId10"/>
-    <p:sldId id="266" r:id="rId11"/>
-    <p:sldId id="279" r:id="rId12"/>
-    <p:sldId id="268" r:id="rId13"/>
-    <p:sldId id="270" r:id="rId14"/>
-    <p:sldId id="271" r:id="rId15"/>
-    <p:sldId id="272" r:id="rId16"/>
-    <p:sldId id="280" r:id="rId17"/>
-    <p:sldId id="274" r:id="rId18"/>
-    <p:sldId id="281" r:id="rId19"/>
-    <p:sldId id="284" r:id="rId20"/>
-    <p:sldId id="264" r:id="rId21"/>
-    <p:sldId id="296" r:id="rId22"/>
-    <p:sldId id="292" r:id="rId23"/>
-    <p:sldId id="297" r:id="rId24"/>
-    <p:sldId id="298" r:id="rId25"/>
-    <p:sldId id="288" r:id="rId26"/>
-    <p:sldId id="265" r:id="rId27"/>
-    <p:sldId id="290" r:id="rId28"/>
-    <p:sldId id="299" r:id="rId29"/>
+    <p:sldId id="300" r:id="rId5"/>
+    <p:sldId id="260" r:id="rId6"/>
+    <p:sldId id="273" r:id="rId7"/>
+    <p:sldId id="276" r:id="rId8"/>
+    <p:sldId id="293" r:id="rId9"/>
+    <p:sldId id="277" r:id="rId10"/>
+    <p:sldId id="263" r:id="rId11"/>
+    <p:sldId id="266" r:id="rId12"/>
+    <p:sldId id="279" r:id="rId13"/>
+    <p:sldId id="268" r:id="rId14"/>
+    <p:sldId id="270" r:id="rId15"/>
+    <p:sldId id="271" r:id="rId16"/>
+    <p:sldId id="272" r:id="rId17"/>
+    <p:sldId id="280" r:id="rId18"/>
+    <p:sldId id="274" r:id="rId19"/>
+    <p:sldId id="281" r:id="rId20"/>
+    <p:sldId id="284" r:id="rId21"/>
+    <p:sldId id="264" r:id="rId22"/>
+    <p:sldId id="296" r:id="rId23"/>
+    <p:sldId id="292" r:id="rId24"/>
+    <p:sldId id="297" r:id="rId25"/>
+    <p:sldId id="298" r:id="rId26"/>
+    <p:sldId id="288" r:id="rId27"/>
+    <p:sldId id="265" r:id="rId28"/>
+    <p:sldId id="290" r:id="rId29"/>
+    <p:sldId id="299" r:id="rId30"/>
   </p:sldIdLst>
   <p:sldSz cx="12192000" cy="6858000"/>
   <p:notesSz cx="6858000" cy="9144000"/>
@@ -286,7 +287,7 @@
           <a:p>
             <a:fld id="{48C24DAA-3C6E-41A5-A3C8-68DE86596504}" type="datetimeFigureOut">
               <a:rPr lang="zh-TW" altLang="en-US" smtClean="0"/>
-              <a:t>2022/3/16</a:t>
+              <a:t>2022/3/29</a:t>
             </a:fld>
             <a:endParaRPr lang="zh-TW" altLang="en-US"/>
           </a:p>
@@ -484,7 +485,7 @@
           <a:p>
             <a:fld id="{48C24DAA-3C6E-41A5-A3C8-68DE86596504}" type="datetimeFigureOut">
               <a:rPr lang="zh-TW" altLang="en-US" smtClean="0"/>
-              <a:t>2022/3/16</a:t>
+              <a:t>2022/3/29</a:t>
             </a:fld>
             <a:endParaRPr lang="zh-TW" altLang="en-US"/>
           </a:p>
@@ -692,7 +693,7 @@
           <a:p>
             <a:fld id="{48C24DAA-3C6E-41A5-A3C8-68DE86596504}" type="datetimeFigureOut">
               <a:rPr lang="zh-TW" altLang="en-US" smtClean="0"/>
-              <a:t>2022/3/16</a:t>
+              <a:t>2022/3/29</a:t>
             </a:fld>
             <a:endParaRPr lang="zh-TW" altLang="en-US"/>
           </a:p>
@@ -897,7 +898,7 @@
           <a:p>
             <a:fld id="{48C24DAA-3C6E-41A5-A3C8-68DE86596504}" type="datetimeFigureOut">
               <a:rPr lang="zh-TW" altLang="en-US" smtClean="0"/>
-              <a:t>2022/3/16</a:t>
+              <a:t>2022/3/29</a:t>
             </a:fld>
             <a:endParaRPr lang="zh-TW" altLang="en-US"/>
           </a:p>
@@ -1172,7 +1173,7 @@
           <a:p>
             <a:fld id="{48C24DAA-3C6E-41A5-A3C8-68DE86596504}" type="datetimeFigureOut">
               <a:rPr lang="zh-TW" altLang="en-US" smtClean="0"/>
-              <a:t>2022/3/16</a:t>
+              <a:t>2022/3/29</a:t>
             </a:fld>
             <a:endParaRPr lang="zh-TW" altLang="en-US"/>
           </a:p>
@@ -1437,7 +1438,7 @@
           <a:p>
             <a:fld id="{48C24DAA-3C6E-41A5-A3C8-68DE86596504}" type="datetimeFigureOut">
               <a:rPr lang="zh-TW" altLang="en-US" smtClean="0"/>
-              <a:t>2022/3/16</a:t>
+              <a:t>2022/3/29</a:t>
             </a:fld>
             <a:endParaRPr lang="zh-TW" altLang="en-US"/>
           </a:p>
@@ -1849,7 +1850,7 @@
           <a:p>
             <a:fld id="{48C24DAA-3C6E-41A5-A3C8-68DE86596504}" type="datetimeFigureOut">
               <a:rPr lang="zh-TW" altLang="en-US" smtClean="0"/>
-              <a:t>2022/3/16</a:t>
+              <a:t>2022/3/29</a:t>
             </a:fld>
             <a:endParaRPr lang="zh-TW" altLang="en-US"/>
           </a:p>
@@ -1990,7 +1991,7 @@
           <a:p>
             <a:fld id="{48C24DAA-3C6E-41A5-A3C8-68DE86596504}" type="datetimeFigureOut">
               <a:rPr lang="zh-TW" altLang="en-US" smtClean="0"/>
-              <a:t>2022/3/16</a:t>
+              <a:t>2022/3/29</a:t>
             </a:fld>
             <a:endParaRPr lang="zh-TW" altLang="en-US"/>
           </a:p>
@@ -2103,7 +2104,7 @@
           <a:p>
             <a:fld id="{48C24DAA-3C6E-41A5-A3C8-68DE86596504}" type="datetimeFigureOut">
               <a:rPr lang="zh-TW" altLang="en-US" smtClean="0"/>
-              <a:t>2022/3/16</a:t>
+              <a:t>2022/3/29</a:t>
             </a:fld>
             <a:endParaRPr lang="zh-TW" altLang="en-US"/>
           </a:p>
@@ -2414,7 +2415,7 @@
           <a:p>
             <a:fld id="{48C24DAA-3C6E-41A5-A3C8-68DE86596504}" type="datetimeFigureOut">
               <a:rPr lang="zh-TW" altLang="en-US" smtClean="0"/>
-              <a:t>2022/3/16</a:t>
+              <a:t>2022/3/29</a:t>
             </a:fld>
             <a:endParaRPr lang="zh-TW" altLang="en-US"/>
           </a:p>
@@ -2702,7 +2703,7 @@
           <a:p>
             <a:fld id="{48C24DAA-3C6E-41A5-A3C8-68DE86596504}" type="datetimeFigureOut">
               <a:rPr lang="zh-TW" altLang="en-US" smtClean="0"/>
-              <a:t>2022/3/16</a:t>
+              <a:t>2022/3/29</a:t>
             </a:fld>
             <a:endParaRPr lang="zh-TW" altLang="en-US"/>
           </a:p>
@@ -2965,7 +2966,7 @@
           <a:p>
             <a:fld id="{48C24DAA-3C6E-41A5-A3C8-68DE86596504}" type="datetimeFigureOut">
               <a:rPr lang="zh-TW" altLang="en-US" smtClean="0"/>
-              <a:t>2022/3/16</a:t>
+              <a:t>2022/3/29</a:t>
             </a:fld>
             <a:endParaRPr lang="zh-TW" altLang="en-US"/>
           </a:p>
@@ -3707,6 +3708,1194 @@
 </file>
 
 <file path=ppt/slides/slide10.xml><?xml version="1.0" encoding="utf-8"?>
+<p:sld xmlns:a="http://schemas.openxmlformats.org/drawingml/2006/main" xmlns:r="http://schemas.openxmlformats.org/officeDocument/2006/relationships" xmlns:p="http://schemas.openxmlformats.org/presentationml/2006/main">
+  <p:cSld>
+    <p:spTree>
+      <p:nvGrpSpPr>
+        <p:cNvPr id="1" name=""/>
+        <p:cNvGrpSpPr/>
+        <p:nvPr/>
+      </p:nvGrpSpPr>
+      <p:grpSpPr>
+        <a:xfrm>
+          <a:off x="0" y="0"/>
+          <a:ext cx="0" cy="0"/>
+          <a:chOff x="0" y="0"/>
+          <a:chExt cx="0" cy="0"/>
+        </a:xfrm>
+      </p:grpSpPr>
+      <p:sp>
+        <p:nvSpPr>
+          <p:cNvPr id="3" name="標題 1">
+            <a:extLst>
+              <a:ext uri="{FF2B5EF4-FFF2-40B4-BE49-F238E27FC236}">
+                <a16:creationId xmlns:a16="http://schemas.microsoft.com/office/drawing/2014/main" id="{0F5E33BC-9F02-487D-AE79-42ACA7C859E5}"/>
+              </a:ext>
+            </a:extLst>
+          </p:cNvPr>
+          <p:cNvSpPr>
+            <a:spLocks noGrp="1"/>
+          </p:cNvSpPr>
+          <p:nvPr>
+            <p:ph type="title"/>
+          </p:nvPr>
+        </p:nvSpPr>
+        <p:spPr>
+          <a:xfrm>
+            <a:off x="82421" y="136525"/>
+            <a:ext cx="10515600" cy="614589"/>
+          </a:xfrm>
+        </p:spPr>
+        <p:txBody>
+          <a:bodyPr>
+            <a:normAutofit fontScale="90000"/>
+          </a:bodyPr>
+          <a:lstStyle/>
+          <a:p>
+            <a:r>
+              <a:rPr lang="en-US" altLang="zh-TW" dirty="0">
+                <a:latin typeface="Microsoft YaHei" panose="020B0503020204020204" pitchFamily="34" charset="-122"/>
+                <a:ea typeface="Microsoft YaHei" panose="020B0503020204020204" pitchFamily="34" charset="-122"/>
+              </a:rPr>
+              <a:t>Python</a:t>
+            </a:r>
+            <a:r>
+              <a:rPr lang="zh-TW" altLang="en-US" dirty="0">
+                <a:latin typeface="Microsoft YaHei" panose="020B0503020204020204" pitchFamily="34" charset="-122"/>
+                <a:ea typeface="Microsoft YaHei" panose="020B0503020204020204" pitchFamily="34" charset="-122"/>
+              </a:rPr>
+              <a:t> 資料型態</a:t>
+            </a:r>
+          </a:p>
+        </p:txBody>
+      </p:sp>
+      <p:sp>
+        <p:nvSpPr>
+          <p:cNvPr id="9" name="矩形 8">
+            <a:extLst>
+              <a:ext uri="{FF2B5EF4-FFF2-40B4-BE49-F238E27FC236}">
+                <a16:creationId xmlns:a16="http://schemas.microsoft.com/office/drawing/2014/main" id="{47CDA9F8-1BA5-4487-A1AE-E43363B14943}"/>
+              </a:ext>
+            </a:extLst>
+          </p:cNvPr>
+          <p:cNvSpPr/>
+          <p:nvPr/>
+        </p:nvSpPr>
+        <p:spPr>
+          <a:xfrm>
+            <a:off x="903833" y="673522"/>
+            <a:ext cx="4371431" cy="461665"/>
+          </a:xfrm>
+          <a:prstGeom prst="rect">
+            <a:avLst/>
+          </a:prstGeom>
+          <a:noFill/>
+        </p:spPr>
+        <p:txBody>
+          <a:bodyPr wrap="square" lIns="91440" tIns="45720" rIns="91440" bIns="45720">
+            <a:spAutoFit/>
+          </a:bodyPr>
+          <a:lstStyle/>
+          <a:p>
+            <a:pPr algn="ctr"/>
+            <a:r>
+              <a:rPr lang="zh-TW" altLang="en-US" sz="2400" b="1" spc="50" dirty="0">
+                <a:ln w="9525" cmpd="sng">
+                  <a:solidFill>
+                    <a:schemeClr val="accent1"/>
+                  </a:solidFill>
+                  <a:prstDash val="solid"/>
+                </a:ln>
+                <a:solidFill>
+                  <a:srgbClr val="70AD47">
+                    <a:tint val="1000"/>
+                  </a:srgbClr>
+                </a:solidFill>
+                <a:effectLst>
+                  <a:glow rad="38100">
+                    <a:schemeClr val="accent1">
+                      <a:alpha val="40000"/>
+                    </a:schemeClr>
+                  </a:glow>
+                </a:effectLst>
+              </a:rPr>
+              <a:t>類</a:t>
+            </a:r>
+            <a:r>
+              <a:rPr lang="zh-TW" altLang="en-US" sz="2400" b="1" cap="none" spc="50" dirty="0">
+                <a:ln w="9525" cmpd="sng">
+                  <a:solidFill>
+                    <a:schemeClr val="accent1"/>
+                  </a:solidFill>
+                  <a:prstDash val="solid"/>
+                </a:ln>
+                <a:solidFill>
+                  <a:srgbClr val="70AD47">
+                    <a:tint val="1000"/>
+                  </a:srgbClr>
+                </a:solidFill>
+                <a:effectLst>
+                  <a:glow rad="38100">
+                    <a:schemeClr val="accent1">
+                      <a:alpha val="40000"/>
+                    </a:schemeClr>
+                  </a:glow>
+                </a:effectLst>
+              </a:rPr>
+              <a:t>別</a:t>
+            </a:r>
+            <a:r>
+              <a:rPr lang="en-US" altLang="zh-TW" sz="2400" b="1" cap="none" spc="50" dirty="0">
+                <a:ln w="9525" cmpd="sng">
+                  <a:solidFill>
+                    <a:schemeClr val="accent1"/>
+                  </a:solidFill>
+                  <a:prstDash val="solid"/>
+                </a:ln>
+                <a:solidFill>
+                  <a:srgbClr val="70AD47">
+                    <a:tint val="1000"/>
+                  </a:srgbClr>
+                </a:solidFill>
+                <a:effectLst>
+                  <a:glow rad="38100">
+                    <a:schemeClr val="accent1">
+                      <a:alpha val="40000"/>
+                    </a:schemeClr>
+                  </a:glow>
+                </a:effectLst>
+              </a:rPr>
+              <a:t>(</a:t>
+            </a:r>
+            <a:r>
+              <a:rPr lang="en-US" altLang="zh-TW" sz="2400" b="1" spc="50" dirty="0">
+                <a:ln w="9525" cmpd="sng">
+                  <a:solidFill>
+                    <a:schemeClr val="accent1"/>
+                  </a:solidFill>
+                  <a:prstDash val="solid"/>
+                </a:ln>
+                <a:solidFill>
+                  <a:srgbClr val="70AD47">
+                    <a:tint val="1000"/>
+                  </a:srgbClr>
+                </a:solidFill>
+                <a:effectLst>
+                  <a:glow rad="38100">
+                    <a:schemeClr val="accent1">
+                      <a:alpha val="40000"/>
+                    </a:schemeClr>
+                  </a:glow>
+                </a:effectLst>
+              </a:rPr>
+              <a:t>class</a:t>
+            </a:r>
+            <a:r>
+              <a:rPr lang="en-US" altLang="zh-TW" sz="2400" b="1" cap="none" spc="50" dirty="0">
+                <a:ln w="9525" cmpd="sng">
+                  <a:solidFill>
+                    <a:schemeClr val="accent1"/>
+                  </a:solidFill>
+                  <a:prstDash val="solid"/>
+                </a:ln>
+                <a:solidFill>
+                  <a:srgbClr val="70AD47">
+                    <a:tint val="1000"/>
+                  </a:srgbClr>
+                </a:solidFill>
+                <a:effectLst>
+                  <a:glow rad="38100">
+                    <a:schemeClr val="accent1">
+                      <a:alpha val="40000"/>
+                    </a:schemeClr>
+                  </a:glow>
+                </a:effectLst>
+              </a:rPr>
+              <a:t>)</a:t>
+            </a:r>
+            <a:endParaRPr lang="zh-TW" altLang="en-US" sz="2400" b="1" cap="none" spc="50" dirty="0">
+              <a:ln w="9525" cmpd="sng">
+                <a:solidFill>
+                  <a:schemeClr val="accent1"/>
+                </a:solidFill>
+                <a:prstDash val="solid"/>
+              </a:ln>
+              <a:solidFill>
+                <a:srgbClr val="70AD47">
+                  <a:tint val="1000"/>
+                </a:srgbClr>
+              </a:solidFill>
+              <a:effectLst>
+                <a:glow rad="38100">
+                  <a:schemeClr val="accent1">
+                    <a:alpha val="40000"/>
+                  </a:schemeClr>
+                </a:glow>
+              </a:effectLst>
+            </a:endParaRPr>
+          </a:p>
+        </p:txBody>
+      </p:sp>
+      <p:sp>
+        <p:nvSpPr>
+          <p:cNvPr id="10" name="矩形 9">
+            <a:extLst>
+              <a:ext uri="{FF2B5EF4-FFF2-40B4-BE49-F238E27FC236}">
+                <a16:creationId xmlns:a16="http://schemas.microsoft.com/office/drawing/2014/main" id="{FD2CDC5E-8F7C-4479-82AE-B4AB0DF0D0DF}"/>
+              </a:ext>
+            </a:extLst>
+          </p:cNvPr>
+          <p:cNvSpPr/>
+          <p:nvPr/>
+        </p:nvSpPr>
+        <p:spPr>
+          <a:xfrm>
+            <a:off x="4072016" y="697354"/>
+            <a:ext cx="4371431" cy="461665"/>
+          </a:xfrm>
+          <a:prstGeom prst="rect">
+            <a:avLst/>
+          </a:prstGeom>
+          <a:noFill/>
+        </p:spPr>
+        <p:txBody>
+          <a:bodyPr wrap="square" lIns="91440" tIns="45720" rIns="91440" bIns="45720">
+            <a:spAutoFit/>
+          </a:bodyPr>
+          <a:lstStyle/>
+          <a:p>
+            <a:pPr algn="ctr"/>
+            <a:r>
+              <a:rPr lang="zh-TW" altLang="en-US" sz="2400" b="1" spc="50" dirty="0">
+                <a:ln w="9525" cmpd="sng">
+                  <a:solidFill>
+                    <a:schemeClr val="accent1"/>
+                  </a:solidFill>
+                  <a:prstDash val="solid"/>
+                </a:ln>
+                <a:solidFill>
+                  <a:srgbClr val="70AD47">
+                    <a:tint val="1000"/>
+                  </a:srgbClr>
+                </a:solidFill>
+                <a:effectLst>
+                  <a:glow rad="38100">
+                    <a:schemeClr val="accent1">
+                      <a:alpha val="40000"/>
+                    </a:schemeClr>
+                  </a:glow>
+                </a:effectLst>
+              </a:rPr>
+              <a:t>物件</a:t>
+            </a:r>
+            <a:r>
+              <a:rPr lang="en-US" altLang="zh-TW" sz="2400" b="1" cap="none" spc="50" dirty="0">
+                <a:ln w="9525" cmpd="sng">
+                  <a:solidFill>
+                    <a:schemeClr val="accent1"/>
+                  </a:solidFill>
+                  <a:prstDash val="solid"/>
+                </a:ln>
+                <a:solidFill>
+                  <a:srgbClr val="70AD47">
+                    <a:tint val="1000"/>
+                  </a:srgbClr>
+                </a:solidFill>
+                <a:effectLst>
+                  <a:glow rad="38100">
+                    <a:schemeClr val="accent1">
+                      <a:alpha val="40000"/>
+                    </a:schemeClr>
+                  </a:glow>
+                </a:effectLst>
+              </a:rPr>
+              <a:t>(</a:t>
+            </a:r>
+            <a:r>
+              <a:rPr lang="en-US" altLang="zh-TW" sz="2400" b="1" spc="50" dirty="0">
+                <a:ln w="9525" cmpd="sng">
+                  <a:solidFill>
+                    <a:schemeClr val="accent1"/>
+                  </a:solidFill>
+                  <a:prstDash val="solid"/>
+                </a:ln>
+                <a:solidFill>
+                  <a:srgbClr val="70AD47">
+                    <a:tint val="1000"/>
+                  </a:srgbClr>
+                </a:solidFill>
+                <a:effectLst>
+                  <a:glow rad="38100">
+                    <a:schemeClr val="accent1">
+                      <a:alpha val="40000"/>
+                    </a:schemeClr>
+                  </a:glow>
+                </a:effectLst>
+              </a:rPr>
+              <a:t>object</a:t>
+            </a:r>
+            <a:r>
+              <a:rPr lang="en-US" altLang="zh-TW" sz="2400" b="1" cap="none" spc="50" dirty="0">
+                <a:ln w="9525" cmpd="sng">
+                  <a:solidFill>
+                    <a:schemeClr val="accent1"/>
+                  </a:solidFill>
+                  <a:prstDash val="solid"/>
+                </a:ln>
+                <a:solidFill>
+                  <a:srgbClr val="70AD47">
+                    <a:tint val="1000"/>
+                  </a:srgbClr>
+                </a:solidFill>
+                <a:effectLst>
+                  <a:glow rad="38100">
+                    <a:schemeClr val="accent1">
+                      <a:alpha val="40000"/>
+                    </a:schemeClr>
+                  </a:glow>
+                </a:effectLst>
+              </a:rPr>
+              <a:t>)</a:t>
+            </a:r>
+            <a:endParaRPr lang="zh-TW" altLang="en-US" sz="2400" b="1" cap="none" spc="50" dirty="0">
+              <a:ln w="9525" cmpd="sng">
+                <a:solidFill>
+                  <a:schemeClr val="accent1"/>
+                </a:solidFill>
+                <a:prstDash val="solid"/>
+              </a:ln>
+              <a:solidFill>
+                <a:srgbClr val="70AD47">
+                  <a:tint val="1000"/>
+                </a:srgbClr>
+              </a:solidFill>
+              <a:effectLst>
+                <a:glow rad="38100">
+                  <a:schemeClr val="accent1">
+                    <a:alpha val="40000"/>
+                  </a:schemeClr>
+                </a:glow>
+              </a:effectLst>
+            </a:endParaRPr>
+          </a:p>
+        </p:txBody>
+      </p:sp>
+      <p:sp>
+        <p:nvSpPr>
+          <p:cNvPr id="12" name="矩形 11">
+            <a:extLst>
+              <a:ext uri="{FF2B5EF4-FFF2-40B4-BE49-F238E27FC236}">
+                <a16:creationId xmlns:a16="http://schemas.microsoft.com/office/drawing/2014/main" id="{486D5593-3F8D-48B9-A2B2-A58AF8C3CE7C}"/>
+              </a:ext>
+            </a:extLst>
+          </p:cNvPr>
+          <p:cNvSpPr/>
+          <p:nvPr/>
+        </p:nvSpPr>
+        <p:spPr>
+          <a:xfrm>
+            <a:off x="7270062" y="706363"/>
+            <a:ext cx="4371431" cy="461665"/>
+          </a:xfrm>
+          <a:prstGeom prst="rect">
+            <a:avLst/>
+          </a:prstGeom>
+          <a:noFill/>
+        </p:spPr>
+        <p:txBody>
+          <a:bodyPr wrap="square" lIns="91440" tIns="45720" rIns="91440" bIns="45720">
+            <a:spAutoFit/>
+          </a:bodyPr>
+          <a:lstStyle/>
+          <a:p>
+            <a:pPr algn="ctr"/>
+            <a:r>
+              <a:rPr lang="zh-TW" altLang="en-US" sz="2400" b="1" spc="50" dirty="0">
+                <a:ln w="9525" cmpd="sng">
+                  <a:solidFill>
+                    <a:schemeClr val="accent1"/>
+                  </a:solidFill>
+                  <a:prstDash val="solid"/>
+                </a:ln>
+                <a:solidFill>
+                  <a:srgbClr val="70AD47">
+                    <a:tint val="1000"/>
+                  </a:srgbClr>
+                </a:solidFill>
+                <a:effectLst>
+                  <a:glow rad="38100">
+                    <a:schemeClr val="accent1">
+                      <a:alpha val="40000"/>
+                    </a:schemeClr>
+                  </a:glow>
+                </a:effectLst>
+              </a:rPr>
+              <a:t>描述：</a:t>
+            </a:r>
+            <a:r>
+              <a:rPr lang="en-US" altLang="zh-TW" sz="2400" b="1" spc="50" dirty="0">
+                <a:ln w="9525" cmpd="sng">
+                  <a:solidFill>
+                    <a:schemeClr val="accent1"/>
+                  </a:solidFill>
+                  <a:prstDash val="solid"/>
+                </a:ln>
+                <a:solidFill>
+                  <a:srgbClr val="70AD47">
+                    <a:tint val="1000"/>
+                  </a:srgbClr>
+                </a:solidFill>
+                <a:effectLst>
+                  <a:glow rad="38100">
+                    <a:schemeClr val="accent1">
+                      <a:alpha val="40000"/>
+                    </a:schemeClr>
+                  </a:glow>
+                </a:effectLst>
+              </a:rPr>
+              <a:t>value</a:t>
+            </a:r>
+            <a:endParaRPr lang="zh-TW" altLang="en-US" sz="2400" b="1" spc="50" dirty="0">
+              <a:ln w="9525" cmpd="sng">
+                <a:solidFill>
+                  <a:schemeClr val="accent1"/>
+                </a:solidFill>
+                <a:prstDash val="solid"/>
+              </a:ln>
+              <a:solidFill>
+                <a:srgbClr val="70AD47">
+                  <a:tint val="1000"/>
+                </a:srgbClr>
+              </a:solidFill>
+              <a:effectLst>
+                <a:glow rad="38100">
+                  <a:schemeClr val="accent1">
+                    <a:alpha val="40000"/>
+                  </a:schemeClr>
+                </a:glow>
+              </a:effectLst>
+            </a:endParaRPr>
+          </a:p>
+        </p:txBody>
+      </p:sp>
+      <p:graphicFrame>
+        <p:nvGraphicFramePr>
+          <p:cNvPr id="13" name="表格 12">
+            <a:extLst>
+              <a:ext uri="{FF2B5EF4-FFF2-40B4-BE49-F238E27FC236}">
+                <a16:creationId xmlns:a16="http://schemas.microsoft.com/office/drawing/2014/main" id="{ED3BA8BD-C2EA-4371-B3BF-FD4C5FC74C1F}"/>
+              </a:ext>
+            </a:extLst>
+          </p:cNvPr>
+          <p:cNvGraphicFramePr>
+            <a:graphicFrameLocks noGrp="1"/>
+          </p:cNvGraphicFramePr>
+          <p:nvPr>
+            <p:extLst>
+              <p:ext uri="{D42A27DB-BD31-4B8C-83A1-F6EECF244321}">
+                <p14:modId xmlns:p14="http://schemas.microsoft.com/office/powerpoint/2010/main" val="1946820949"/>
+              </p:ext>
+            </p:extLst>
+          </p:nvPr>
+        </p:nvGraphicFramePr>
+        <p:xfrm>
+          <a:off x="1551490" y="1177037"/>
+          <a:ext cx="9412482" cy="2286000"/>
+        </p:xfrm>
+        <a:graphic>
+          <a:graphicData uri="http://schemas.openxmlformats.org/drawingml/2006/table">
+            <a:tbl>
+              <a:tblPr firstRow="1" bandRow="1">
+                <a:tableStyleId>{5C22544A-7EE6-4342-B048-85BDC9FD1C3A}</a:tableStyleId>
+              </a:tblPr>
+              <a:tblGrid>
+                <a:gridCol w="3137494">
+                  <a:extLst>
+                    <a:ext uri="{9D8B030D-6E8A-4147-A177-3AD203B41FA5}">
+                      <a16:colId xmlns:a16="http://schemas.microsoft.com/office/drawing/2014/main" val="3200434382"/>
+                    </a:ext>
+                  </a:extLst>
+                </a:gridCol>
+                <a:gridCol w="3137494">
+                  <a:extLst>
+                    <a:ext uri="{9D8B030D-6E8A-4147-A177-3AD203B41FA5}">
+                      <a16:colId xmlns:a16="http://schemas.microsoft.com/office/drawing/2014/main" val="21363107"/>
+                    </a:ext>
+                  </a:extLst>
+                </a:gridCol>
+                <a:gridCol w="3137494">
+                  <a:extLst>
+                    <a:ext uri="{9D8B030D-6E8A-4147-A177-3AD203B41FA5}">
+                      <a16:colId xmlns:a16="http://schemas.microsoft.com/office/drawing/2014/main" val="505792392"/>
+                    </a:ext>
+                  </a:extLst>
+                </a:gridCol>
+              </a:tblGrid>
+              <a:tr h="370840">
+                <a:tc>
+                  <a:txBody>
+                    <a:bodyPr/>
+                    <a:lstStyle/>
+                    <a:p>
+                      <a:pPr algn="ctr"/>
+                      <a:r>
+                        <a:rPr lang="en-US" altLang="zh-TW" sz="2400" b="0" dirty="0">
+                          <a:solidFill>
+                            <a:schemeClr val="tx1"/>
+                          </a:solidFill>
+                          <a:latin typeface="Microsoft YaHei" panose="020B0503020204020204" pitchFamily="34" charset="-122"/>
+                          <a:ea typeface="Microsoft YaHei" panose="020B0503020204020204" pitchFamily="34" charset="-122"/>
+                        </a:rPr>
+                        <a:t>integer</a:t>
+                      </a:r>
+                      <a:endParaRPr lang="zh-TW" altLang="en-US" sz="2400" b="0" dirty="0">
+                        <a:solidFill>
+                          <a:schemeClr val="tx1"/>
+                        </a:solidFill>
+                        <a:latin typeface="Microsoft YaHei" panose="020B0503020204020204" pitchFamily="34" charset="-122"/>
+                        <a:ea typeface="Microsoft YaHei" panose="020B0503020204020204" pitchFamily="34" charset="-122"/>
+                      </a:endParaRPr>
+                    </a:p>
+                  </a:txBody>
+                  <a:tcPr>
+                    <a:solidFill>
+                      <a:schemeClr val="bg1">
+                        <a:lumMod val="75000"/>
+                      </a:schemeClr>
+                    </a:solidFill>
+                  </a:tcPr>
+                </a:tc>
+                <a:tc>
+                  <a:txBody>
+                    <a:bodyPr/>
+                    <a:lstStyle/>
+                    <a:p>
+                      <a:pPr algn="ctr"/>
+                      <a:r>
+                        <a:rPr lang="zh-TW" altLang="en-US" sz="2400" b="0" dirty="0">
+                          <a:solidFill>
+                            <a:schemeClr val="tx1"/>
+                          </a:solidFill>
+                          <a:latin typeface="Microsoft YaHei" panose="020B0503020204020204" pitchFamily="34" charset="-122"/>
+                          <a:ea typeface="Microsoft YaHei" panose="020B0503020204020204" pitchFamily="34" charset="-122"/>
+                        </a:rPr>
+                        <a:t>整數</a:t>
+                      </a:r>
+                      <a:r>
+                        <a:rPr lang="en-US" altLang="zh-TW" sz="2400" b="0" dirty="0">
+                          <a:solidFill>
+                            <a:schemeClr val="tx1"/>
+                          </a:solidFill>
+                          <a:latin typeface="Microsoft YaHei" panose="020B0503020204020204" pitchFamily="34" charset="-122"/>
+                          <a:ea typeface="Microsoft YaHei" panose="020B0503020204020204" pitchFamily="34" charset="-122"/>
+                        </a:rPr>
+                        <a:t>1</a:t>
+                      </a:r>
+                      <a:r>
+                        <a:rPr lang="zh-TW" altLang="en-US" sz="2400" b="0" dirty="0">
+                          <a:solidFill>
+                            <a:schemeClr val="tx1"/>
+                          </a:solidFill>
+                          <a:latin typeface="Microsoft YaHei" panose="020B0503020204020204" pitchFamily="34" charset="-122"/>
+                          <a:ea typeface="Microsoft YaHei" panose="020B0503020204020204" pitchFamily="34" charset="-122"/>
+                        </a:rPr>
+                        <a:t>號</a:t>
+                      </a:r>
+                    </a:p>
+                  </a:txBody>
+                  <a:tcPr>
+                    <a:solidFill>
+                      <a:schemeClr val="bg1">
+                        <a:lumMod val="75000"/>
+                      </a:schemeClr>
+                    </a:solidFill>
+                  </a:tcPr>
+                </a:tc>
+                <a:tc>
+                  <a:txBody>
+                    <a:bodyPr/>
+                    <a:lstStyle/>
+                    <a:p>
+                      <a:pPr algn="ctr"/>
+                      <a:r>
+                        <a:rPr lang="en-US" altLang="zh-TW" sz="2400" b="0" dirty="0">
+                          <a:solidFill>
+                            <a:schemeClr val="tx1"/>
+                          </a:solidFill>
+                          <a:latin typeface="Microsoft YaHei" panose="020B0503020204020204" pitchFamily="34" charset="-122"/>
+                          <a:ea typeface="Microsoft YaHei" panose="020B0503020204020204" pitchFamily="34" charset="-122"/>
+                        </a:rPr>
+                        <a:t>10</a:t>
+                      </a:r>
+                      <a:endParaRPr lang="zh-TW" altLang="en-US" sz="2400" b="0" dirty="0">
+                        <a:solidFill>
+                          <a:schemeClr val="tx1"/>
+                        </a:solidFill>
+                        <a:latin typeface="Microsoft YaHei" panose="020B0503020204020204" pitchFamily="34" charset="-122"/>
+                        <a:ea typeface="Microsoft YaHei" panose="020B0503020204020204" pitchFamily="34" charset="-122"/>
+                      </a:endParaRPr>
+                    </a:p>
+                  </a:txBody>
+                  <a:tcPr>
+                    <a:solidFill>
+                      <a:schemeClr val="bg1">
+                        <a:lumMod val="75000"/>
+                      </a:schemeClr>
+                    </a:solidFill>
+                  </a:tcPr>
+                </a:tc>
+                <a:extLst>
+                  <a:ext uri="{0D108BD9-81ED-4DB2-BD59-A6C34878D82A}">
+                    <a16:rowId xmlns:a16="http://schemas.microsoft.com/office/drawing/2014/main" val="4202669326"/>
+                  </a:ext>
+                </a:extLst>
+              </a:tr>
+              <a:tr h="370840">
+                <a:tc>
+                  <a:txBody>
+                    <a:bodyPr/>
+                    <a:lstStyle/>
+                    <a:p>
+                      <a:pPr algn="ctr"/>
+                      <a:r>
+                        <a:rPr lang="en-US" altLang="zh-TW" sz="2400" b="0" dirty="0">
+                          <a:solidFill>
+                            <a:schemeClr val="tx1"/>
+                          </a:solidFill>
+                          <a:latin typeface="Microsoft YaHei" panose="020B0503020204020204" pitchFamily="34" charset="-122"/>
+                          <a:ea typeface="Microsoft YaHei" panose="020B0503020204020204" pitchFamily="34" charset="-122"/>
+                        </a:rPr>
+                        <a:t>float</a:t>
+                      </a:r>
+                      <a:endParaRPr lang="zh-TW" altLang="en-US" sz="2400" b="0" dirty="0">
+                        <a:solidFill>
+                          <a:schemeClr val="tx1"/>
+                        </a:solidFill>
+                        <a:latin typeface="Microsoft YaHei" panose="020B0503020204020204" pitchFamily="34" charset="-122"/>
+                        <a:ea typeface="Microsoft YaHei" panose="020B0503020204020204" pitchFamily="34" charset="-122"/>
+                      </a:endParaRPr>
+                    </a:p>
+                  </a:txBody>
+                  <a:tcPr>
+                    <a:solidFill>
+                      <a:schemeClr val="bg1">
+                        <a:lumMod val="75000"/>
+                      </a:schemeClr>
+                    </a:solidFill>
+                  </a:tcPr>
+                </a:tc>
+                <a:tc>
+                  <a:txBody>
+                    <a:bodyPr/>
+                    <a:lstStyle/>
+                    <a:p>
+                      <a:pPr algn="ctr"/>
+                      <a:r>
+                        <a:rPr lang="zh-TW" altLang="en-US" sz="2400" b="0" dirty="0">
+                          <a:solidFill>
+                            <a:schemeClr val="tx1"/>
+                          </a:solidFill>
+                          <a:latin typeface="Microsoft YaHei" panose="020B0503020204020204" pitchFamily="34" charset="-122"/>
+                          <a:ea typeface="Microsoft YaHei" panose="020B0503020204020204" pitchFamily="34" charset="-122"/>
+                        </a:rPr>
+                        <a:t>浮點數</a:t>
+                      </a:r>
+                      <a:r>
+                        <a:rPr lang="en-US" altLang="zh-TW" sz="2400" b="0" dirty="0">
+                          <a:solidFill>
+                            <a:schemeClr val="tx1"/>
+                          </a:solidFill>
+                          <a:latin typeface="Microsoft YaHei" panose="020B0503020204020204" pitchFamily="34" charset="-122"/>
+                          <a:ea typeface="Microsoft YaHei" panose="020B0503020204020204" pitchFamily="34" charset="-122"/>
+                        </a:rPr>
+                        <a:t>1</a:t>
+                      </a:r>
+                      <a:r>
+                        <a:rPr lang="zh-TW" altLang="en-US" sz="2400" b="0" dirty="0">
+                          <a:solidFill>
+                            <a:schemeClr val="tx1"/>
+                          </a:solidFill>
+                          <a:latin typeface="Microsoft YaHei" panose="020B0503020204020204" pitchFamily="34" charset="-122"/>
+                          <a:ea typeface="Microsoft YaHei" panose="020B0503020204020204" pitchFamily="34" charset="-122"/>
+                        </a:rPr>
+                        <a:t>號</a:t>
+                      </a:r>
+                    </a:p>
+                  </a:txBody>
+                  <a:tcPr>
+                    <a:solidFill>
+                      <a:schemeClr val="bg1">
+                        <a:lumMod val="75000"/>
+                      </a:schemeClr>
+                    </a:solidFill>
+                  </a:tcPr>
+                </a:tc>
+                <a:tc>
+                  <a:txBody>
+                    <a:bodyPr/>
+                    <a:lstStyle/>
+                    <a:p>
+                      <a:pPr algn="ctr"/>
+                      <a:r>
+                        <a:rPr lang="en-US" altLang="zh-TW" sz="2400" b="0" dirty="0">
+                          <a:solidFill>
+                            <a:schemeClr val="tx1"/>
+                          </a:solidFill>
+                          <a:latin typeface="Microsoft YaHei" panose="020B0503020204020204" pitchFamily="34" charset="-122"/>
+                          <a:ea typeface="Microsoft YaHei" panose="020B0503020204020204" pitchFamily="34" charset="-122"/>
+                        </a:rPr>
+                        <a:t>10.567</a:t>
+                      </a:r>
+                      <a:endParaRPr lang="zh-TW" altLang="en-US" sz="2400" b="0" dirty="0">
+                        <a:solidFill>
+                          <a:schemeClr val="tx1"/>
+                        </a:solidFill>
+                        <a:latin typeface="Microsoft YaHei" panose="020B0503020204020204" pitchFamily="34" charset="-122"/>
+                        <a:ea typeface="Microsoft YaHei" panose="020B0503020204020204" pitchFamily="34" charset="-122"/>
+                      </a:endParaRPr>
+                    </a:p>
+                  </a:txBody>
+                  <a:tcPr>
+                    <a:solidFill>
+                      <a:schemeClr val="bg1">
+                        <a:lumMod val="75000"/>
+                      </a:schemeClr>
+                    </a:solidFill>
+                  </a:tcPr>
+                </a:tc>
+                <a:extLst>
+                  <a:ext uri="{0D108BD9-81ED-4DB2-BD59-A6C34878D82A}">
+                    <a16:rowId xmlns:a16="http://schemas.microsoft.com/office/drawing/2014/main" val="1372854998"/>
+                  </a:ext>
+                </a:extLst>
+              </a:tr>
+              <a:tr h="370840">
+                <a:tc>
+                  <a:txBody>
+                    <a:bodyPr/>
+                    <a:lstStyle/>
+                    <a:p>
+                      <a:pPr algn="ctr"/>
+                      <a:r>
+                        <a:rPr lang="en-US" altLang="zh-TW" sz="2400" b="0" dirty="0">
+                          <a:solidFill>
+                            <a:schemeClr val="tx1"/>
+                          </a:solidFill>
+                          <a:latin typeface="Microsoft YaHei" panose="020B0503020204020204" pitchFamily="34" charset="-122"/>
+                          <a:ea typeface="Microsoft YaHei" panose="020B0503020204020204" pitchFamily="34" charset="-122"/>
+                        </a:rPr>
+                        <a:t>string</a:t>
+                      </a:r>
+                      <a:endParaRPr lang="zh-TW" altLang="en-US" sz="2400" b="0" dirty="0">
+                        <a:solidFill>
+                          <a:schemeClr val="tx1"/>
+                        </a:solidFill>
+                        <a:latin typeface="Microsoft YaHei" panose="020B0503020204020204" pitchFamily="34" charset="-122"/>
+                        <a:ea typeface="Microsoft YaHei" panose="020B0503020204020204" pitchFamily="34" charset="-122"/>
+                      </a:endParaRPr>
+                    </a:p>
+                  </a:txBody>
+                  <a:tcPr>
+                    <a:solidFill>
+                      <a:schemeClr val="bg1">
+                        <a:lumMod val="75000"/>
+                      </a:schemeClr>
+                    </a:solidFill>
+                  </a:tcPr>
+                </a:tc>
+                <a:tc>
+                  <a:txBody>
+                    <a:bodyPr/>
+                    <a:lstStyle/>
+                    <a:p>
+                      <a:pPr algn="ctr"/>
+                      <a:r>
+                        <a:rPr lang="zh-TW" altLang="en-US" sz="2400" b="0" dirty="0">
+                          <a:solidFill>
+                            <a:schemeClr val="tx1"/>
+                          </a:solidFill>
+                          <a:latin typeface="Microsoft YaHei" panose="020B0503020204020204" pitchFamily="34" charset="-122"/>
+                          <a:ea typeface="Microsoft YaHei" panose="020B0503020204020204" pitchFamily="34" charset="-122"/>
+                        </a:rPr>
+                        <a:t>字串</a:t>
+                      </a:r>
+                      <a:r>
+                        <a:rPr lang="en-US" altLang="zh-TW" sz="2400" b="0" dirty="0">
+                          <a:solidFill>
+                            <a:schemeClr val="tx1"/>
+                          </a:solidFill>
+                          <a:latin typeface="Microsoft YaHei" panose="020B0503020204020204" pitchFamily="34" charset="-122"/>
+                          <a:ea typeface="Microsoft YaHei" panose="020B0503020204020204" pitchFamily="34" charset="-122"/>
+                        </a:rPr>
+                        <a:t>1</a:t>
+                      </a:r>
+                      <a:r>
+                        <a:rPr lang="zh-TW" altLang="en-US" sz="2400" b="0" dirty="0">
+                          <a:solidFill>
+                            <a:schemeClr val="tx1"/>
+                          </a:solidFill>
+                          <a:latin typeface="Microsoft YaHei" panose="020B0503020204020204" pitchFamily="34" charset="-122"/>
+                          <a:ea typeface="Microsoft YaHei" panose="020B0503020204020204" pitchFamily="34" charset="-122"/>
+                        </a:rPr>
+                        <a:t>號</a:t>
+                      </a:r>
+                    </a:p>
+                  </a:txBody>
+                  <a:tcPr>
+                    <a:solidFill>
+                      <a:schemeClr val="bg1">
+                        <a:lumMod val="75000"/>
+                      </a:schemeClr>
+                    </a:solidFill>
+                  </a:tcPr>
+                </a:tc>
+                <a:tc>
+                  <a:txBody>
+                    <a:bodyPr/>
+                    <a:lstStyle/>
+                    <a:p>
+                      <a:pPr algn="ctr"/>
+                      <a:r>
+                        <a:rPr lang="en-US" altLang="zh-TW" sz="2400" b="0" dirty="0">
+                          <a:solidFill>
+                            <a:schemeClr val="tx1"/>
+                          </a:solidFill>
+                          <a:latin typeface="Microsoft YaHei" panose="020B0503020204020204" pitchFamily="34" charset="-122"/>
+                          <a:ea typeface="Microsoft YaHei" panose="020B0503020204020204" pitchFamily="34" charset="-122"/>
+                        </a:rPr>
+                        <a:t>“hello”</a:t>
+                      </a:r>
+                      <a:endParaRPr lang="zh-TW" altLang="en-US" sz="2400" b="0" dirty="0">
+                        <a:solidFill>
+                          <a:schemeClr val="tx1"/>
+                        </a:solidFill>
+                        <a:latin typeface="Microsoft YaHei" panose="020B0503020204020204" pitchFamily="34" charset="-122"/>
+                        <a:ea typeface="Microsoft YaHei" panose="020B0503020204020204" pitchFamily="34" charset="-122"/>
+                      </a:endParaRPr>
+                    </a:p>
+                  </a:txBody>
+                  <a:tcPr>
+                    <a:solidFill>
+                      <a:schemeClr val="bg1">
+                        <a:lumMod val="75000"/>
+                      </a:schemeClr>
+                    </a:solidFill>
+                  </a:tcPr>
+                </a:tc>
+                <a:extLst>
+                  <a:ext uri="{0D108BD9-81ED-4DB2-BD59-A6C34878D82A}">
+                    <a16:rowId xmlns:a16="http://schemas.microsoft.com/office/drawing/2014/main" val="140849338"/>
+                  </a:ext>
+                </a:extLst>
+              </a:tr>
+              <a:tr h="370840">
+                <a:tc>
+                  <a:txBody>
+                    <a:bodyPr/>
+                    <a:lstStyle/>
+                    <a:p>
+                      <a:pPr algn="ctr"/>
+                      <a:r>
+                        <a:rPr lang="en-US" altLang="zh-TW" sz="2400" b="0" dirty="0">
+                          <a:solidFill>
+                            <a:schemeClr val="tx1"/>
+                          </a:solidFill>
+                          <a:latin typeface="Microsoft YaHei" panose="020B0503020204020204" pitchFamily="34" charset="-122"/>
+                          <a:ea typeface="Microsoft YaHei" panose="020B0503020204020204" pitchFamily="34" charset="-122"/>
+                        </a:rPr>
+                        <a:t>…</a:t>
+                      </a:r>
+                      <a:endParaRPr lang="zh-TW" altLang="en-US" sz="2400" b="0" dirty="0">
+                        <a:solidFill>
+                          <a:schemeClr val="tx1"/>
+                        </a:solidFill>
+                        <a:latin typeface="Microsoft YaHei" panose="020B0503020204020204" pitchFamily="34" charset="-122"/>
+                        <a:ea typeface="Microsoft YaHei" panose="020B0503020204020204" pitchFamily="34" charset="-122"/>
+                      </a:endParaRPr>
+                    </a:p>
+                  </a:txBody>
+                  <a:tcPr>
+                    <a:solidFill>
+                      <a:schemeClr val="bg1">
+                        <a:lumMod val="75000"/>
+                      </a:schemeClr>
+                    </a:solidFill>
+                  </a:tcPr>
+                </a:tc>
+                <a:tc>
+                  <a:txBody>
+                    <a:bodyPr/>
+                    <a:lstStyle/>
+                    <a:p>
+                      <a:pPr algn="ctr"/>
+                      <a:r>
+                        <a:rPr lang="en-US" altLang="zh-TW" sz="2400" b="0" dirty="0">
+                          <a:solidFill>
+                            <a:schemeClr val="tx1"/>
+                          </a:solidFill>
+                          <a:latin typeface="Microsoft YaHei" panose="020B0503020204020204" pitchFamily="34" charset="-122"/>
+                          <a:ea typeface="Microsoft YaHei" panose="020B0503020204020204" pitchFamily="34" charset="-122"/>
+                        </a:rPr>
+                        <a:t>…</a:t>
+                      </a:r>
+                      <a:endParaRPr lang="zh-TW" altLang="en-US" sz="2400" b="0" dirty="0">
+                        <a:solidFill>
+                          <a:schemeClr val="tx1"/>
+                        </a:solidFill>
+                        <a:latin typeface="Microsoft YaHei" panose="020B0503020204020204" pitchFamily="34" charset="-122"/>
+                        <a:ea typeface="Microsoft YaHei" panose="020B0503020204020204" pitchFamily="34" charset="-122"/>
+                      </a:endParaRPr>
+                    </a:p>
+                  </a:txBody>
+                  <a:tcPr>
+                    <a:solidFill>
+                      <a:schemeClr val="bg1">
+                        <a:lumMod val="75000"/>
+                      </a:schemeClr>
+                    </a:solidFill>
+                  </a:tcPr>
+                </a:tc>
+                <a:tc>
+                  <a:txBody>
+                    <a:bodyPr/>
+                    <a:lstStyle/>
+                    <a:p>
+                      <a:pPr algn="ctr"/>
+                      <a:r>
+                        <a:rPr lang="en-US" altLang="zh-TW" sz="2400" b="0" dirty="0">
+                          <a:solidFill>
+                            <a:schemeClr val="tx1"/>
+                          </a:solidFill>
+                          <a:latin typeface="Microsoft YaHei" panose="020B0503020204020204" pitchFamily="34" charset="-122"/>
+                          <a:ea typeface="Microsoft YaHei" panose="020B0503020204020204" pitchFamily="34" charset="-122"/>
+                        </a:rPr>
+                        <a:t>…</a:t>
+                      </a:r>
+                      <a:endParaRPr lang="zh-TW" altLang="en-US" sz="2400" b="0" dirty="0">
+                        <a:solidFill>
+                          <a:schemeClr val="tx1"/>
+                        </a:solidFill>
+                        <a:latin typeface="Microsoft YaHei" panose="020B0503020204020204" pitchFamily="34" charset="-122"/>
+                        <a:ea typeface="Microsoft YaHei" panose="020B0503020204020204" pitchFamily="34" charset="-122"/>
+                      </a:endParaRPr>
+                    </a:p>
+                  </a:txBody>
+                  <a:tcPr>
+                    <a:solidFill>
+                      <a:schemeClr val="bg1">
+                        <a:lumMod val="75000"/>
+                      </a:schemeClr>
+                    </a:solidFill>
+                  </a:tcPr>
+                </a:tc>
+                <a:extLst>
+                  <a:ext uri="{0D108BD9-81ED-4DB2-BD59-A6C34878D82A}">
+                    <a16:rowId xmlns:a16="http://schemas.microsoft.com/office/drawing/2014/main" val="3103123630"/>
+                  </a:ext>
+                </a:extLst>
+              </a:tr>
+              <a:tr h="370840">
+                <a:tc>
+                  <a:txBody>
+                    <a:bodyPr/>
+                    <a:lstStyle/>
+                    <a:p>
+                      <a:pPr algn="ctr"/>
+                      <a:r>
+                        <a:rPr lang="en-US" altLang="zh-TW" sz="2400" b="0" dirty="0" err="1">
+                          <a:solidFill>
+                            <a:schemeClr val="tx1"/>
+                          </a:solidFill>
+                          <a:latin typeface="Microsoft YaHei" panose="020B0503020204020204" pitchFamily="34" charset="-122"/>
+                          <a:ea typeface="Microsoft YaHei" panose="020B0503020204020204" pitchFamily="34" charset="-122"/>
+                        </a:rPr>
+                        <a:t>SomthingClass</a:t>
+                      </a:r>
+                      <a:endParaRPr lang="zh-TW" altLang="en-US" sz="2400" b="0" dirty="0">
+                        <a:solidFill>
+                          <a:schemeClr val="tx1"/>
+                        </a:solidFill>
+                        <a:latin typeface="Microsoft YaHei" panose="020B0503020204020204" pitchFamily="34" charset="-122"/>
+                        <a:ea typeface="Microsoft YaHei" panose="020B0503020204020204" pitchFamily="34" charset="-122"/>
+                      </a:endParaRPr>
+                    </a:p>
+                  </a:txBody>
+                  <a:tcPr>
+                    <a:solidFill>
+                      <a:schemeClr val="bg1">
+                        <a:lumMod val="75000"/>
+                      </a:schemeClr>
+                    </a:solidFill>
+                  </a:tcPr>
+                </a:tc>
+                <a:tc>
+                  <a:txBody>
+                    <a:bodyPr/>
+                    <a:lstStyle/>
+                    <a:p>
+                      <a:pPr algn="ctr"/>
+                      <a:r>
+                        <a:rPr lang="en-US" altLang="zh-TW" sz="2400" b="0" dirty="0">
+                          <a:solidFill>
+                            <a:schemeClr val="tx1"/>
+                          </a:solidFill>
+                          <a:latin typeface="Microsoft YaHei" panose="020B0503020204020204" pitchFamily="34" charset="-122"/>
+                          <a:ea typeface="Microsoft YaHei" panose="020B0503020204020204" pitchFamily="34" charset="-122"/>
+                        </a:rPr>
+                        <a:t>Object1</a:t>
+                      </a:r>
+                      <a:endParaRPr lang="zh-TW" altLang="en-US" sz="2400" b="0" dirty="0">
+                        <a:solidFill>
+                          <a:schemeClr val="tx1"/>
+                        </a:solidFill>
+                        <a:latin typeface="Microsoft YaHei" panose="020B0503020204020204" pitchFamily="34" charset="-122"/>
+                        <a:ea typeface="Microsoft YaHei" panose="020B0503020204020204" pitchFamily="34" charset="-122"/>
+                      </a:endParaRPr>
+                    </a:p>
+                  </a:txBody>
+                  <a:tcPr>
+                    <a:solidFill>
+                      <a:schemeClr val="bg1">
+                        <a:lumMod val="75000"/>
+                      </a:schemeClr>
+                    </a:solidFill>
+                  </a:tcPr>
+                </a:tc>
+                <a:tc>
+                  <a:txBody>
+                    <a:bodyPr/>
+                    <a:lstStyle/>
+                    <a:p>
+                      <a:pPr algn="ctr"/>
+                      <a:r>
+                        <a:rPr lang="en-US" altLang="zh-TW" sz="2400" b="0" dirty="0">
+                          <a:solidFill>
+                            <a:schemeClr val="tx1"/>
+                          </a:solidFill>
+                          <a:latin typeface="Microsoft YaHei" panose="020B0503020204020204" pitchFamily="34" charset="-122"/>
+                          <a:ea typeface="Microsoft YaHei" panose="020B0503020204020204" pitchFamily="34" charset="-122"/>
+                        </a:rPr>
+                        <a:t>Any Value</a:t>
+                      </a:r>
+                      <a:endParaRPr lang="zh-TW" altLang="en-US" sz="2400" b="0" dirty="0">
+                        <a:solidFill>
+                          <a:schemeClr val="tx1"/>
+                        </a:solidFill>
+                        <a:latin typeface="Microsoft YaHei" panose="020B0503020204020204" pitchFamily="34" charset="-122"/>
+                        <a:ea typeface="Microsoft YaHei" panose="020B0503020204020204" pitchFamily="34" charset="-122"/>
+                      </a:endParaRPr>
+                    </a:p>
+                  </a:txBody>
+                  <a:tcPr>
+                    <a:solidFill>
+                      <a:schemeClr val="bg1">
+                        <a:lumMod val="75000"/>
+                      </a:schemeClr>
+                    </a:solidFill>
+                  </a:tcPr>
+                </a:tc>
+                <a:extLst>
+                  <a:ext uri="{0D108BD9-81ED-4DB2-BD59-A6C34878D82A}">
+                    <a16:rowId xmlns:a16="http://schemas.microsoft.com/office/drawing/2014/main" val="2034320953"/>
+                  </a:ext>
+                </a:extLst>
+              </a:tr>
+            </a:tbl>
+          </a:graphicData>
+        </a:graphic>
+      </p:graphicFrame>
+      <p:sp>
+        <p:nvSpPr>
+          <p:cNvPr id="4" name="矩形 3">
+            <a:extLst>
+              <a:ext uri="{FF2B5EF4-FFF2-40B4-BE49-F238E27FC236}">
+                <a16:creationId xmlns:a16="http://schemas.microsoft.com/office/drawing/2014/main" id="{6D911C7B-EF14-4684-961B-37237400F15D}"/>
+              </a:ext>
+            </a:extLst>
+          </p:cNvPr>
+          <p:cNvSpPr/>
+          <p:nvPr/>
+        </p:nvSpPr>
+        <p:spPr>
+          <a:xfrm>
+            <a:off x="1847461" y="4037429"/>
+            <a:ext cx="8647923" cy="2684046"/>
+          </a:xfrm>
+          <a:prstGeom prst="rect">
+            <a:avLst/>
+          </a:prstGeom>
+        </p:spPr>
+        <p:style>
+          <a:lnRef idx="2">
+            <a:schemeClr val="dk1">
+              <a:shade val="50000"/>
+            </a:schemeClr>
+          </a:lnRef>
+          <a:fillRef idx="1">
+            <a:schemeClr val="dk1"/>
+          </a:fillRef>
+          <a:effectRef idx="0">
+            <a:schemeClr val="dk1"/>
+          </a:effectRef>
+          <a:fontRef idx="minor">
+            <a:schemeClr val="lt1"/>
+          </a:fontRef>
+        </p:style>
+        <p:txBody>
+          <a:bodyPr rtlCol="0" anchor="ctr"/>
+          <a:lstStyle/>
+          <a:p>
+            <a:pPr algn="ctr"/>
+            <a:r>
+              <a:rPr lang="en-US" altLang="zh-TW" sz="2800" dirty="0"/>
+              <a:t>A =</a:t>
+            </a:r>
+            <a:r>
+              <a:rPr lang="zh-TW" altLang="en-US" sz="2800" dirty="0"/>
+              <a:t> </a:t>
+            </a:r>
+            <a:r>
+              <a:rPr lang="en-US" altLang="zh-TW" sz="2800" dirty="0"/>
+              <a:t>10</a:t>
+            </a:r>
+          </a:p>
+          <a:p>
+            <a:pPr algn="ctr"/>
+            <a:r>
+              <a:rPr lang="en-US" altLang="zh-TW" sz="2800" dirty="0"/>
+              <a:t>B = 10.567</a:t>
+            </a:r>
+          </a:p>
+          <a:p>
+            <a:pPr algn="ctr"/>
+            <a:r>
+              <a:rPr lang="en-US" altLang="zh-TW" sz="2800" dirty="0"/>
+              <a:t>C = “hello”</a:t>
+            </a:r>
+          </a:p>
+          <a:p>
+            <a:pPr algn="ctr"/>
+            <a:r>
+              <a:rPr lang="en-US" altLang="zh-TW" sz="2800" dirty="0"/>
+              <a:t>…</a:t>
+            </a:r>
+          </a:p>
+        </p:txBody>
+      </p:sp>
+    </p:spTree>
+    <p:extLst>
+      <p:ext uri="{BB962C8B-B14F-4D97-AF65-F5344CB8AC3E}">
+        <p14:creationId xmlns:p14="http://schemas.microsoft.com/office/powerpoint/2010/main" val="2692799197"/>
+      </p:ext>
+    </p:extLst>
+  </p:cSld>
+  <p:clrMapOvr>
+    <a:masterClrMapping/>
+  </p:clrMapOvr>
+</p:sld>
+</file>
+
+<file path=ppt/slides/slide11.xml><?xml version="1.0" encoding="utf-8"?>
 <p:sld xmlns:a="http://schemas.openxmlformats.org/drawingml/2006/main" xmlns:r="http://schemas.openxmlformats.org/officeDocument/2006/relationships" xmlns:p="http://schemas.openxmlformats.org/presentationml/2006/main">
   <p:cSld>
     <p:spTree>
@@ -4487,7 +5676,7 @@
 </p:sld>
 </file>
 
-<file path=ppt/slides/slide11.xml><?xml version="1.0" encoding="utf-8"?>
+<file path=ppt/slides/slide12.xml><?xml version="1.0" encoding="utf-8"?>
 <p:sld xmlns:a="http://schemas.openxmlformats.org/drawingml/2006/main" xmlns:r="http://schemas.openxmlformats.org/officeDocument/2006/relationships" xmlns:p="http://schemas.openxmlformats.org/presentationml/2006/main">
   <p:cSld>
     <p:spTree>
@@ -4585,7 +5774,7 @@
 </p:sld>
 </file>
 
-<file path=ppt/slides/slide12.xml><?xml version="1.0" encoding="utf-8"?>
+<file path=ppt/slides/slide13.xml><?xml version="1.0" encoding="utf-8"?>
 <p:sld xmlns:a="http://schemas.openxmlformats.org/drawingml/2006/main" xmlns:r="http://schemas.openxmlformats.org/officeDocument/2006/relationships" xmlns:p="http://schemas.openxmlformats.org/presentationml/2006/main">
   <p:cSld>
     <p:spTree>
@@ -5036,7 +6225,7 @@
 </p:sld>
 </file>
 
-<file path=ppt/slides/slide13.xml><?xml version="1.0" encoding="utf-8"?>
+<file path=ppt/slides/slide14.xml><?xml version="1.0" encoding="utf-8"?>
 <p:sld xmlns:a="http://schemas.openxmlformats.org/drawingml/2006/main" xmlns:r="http://schemas.openxmlformats.org/officeDocument/2006/relationships" xmlns:p="http://schemas.openxmlformats.org/presentationml/2006/main">
   <p:cSld>
     <p:spTree>
@@ -6884,7 +8073,7 @@
 </p:sld>
 </file>
 
-<file path=ppt/slides/slide14.xml><?xml version="1.0" encoding="utf-8"?>
+<file path=ppt/slides/slide15.xml><?xml version="1.0" encoding="utf-8"?>
 <p:sld xmlns:a="http://schemas.openxmlformats.org/drawingml/2006/main" xmlns:r="http://schemas.openxmlformats.org/officeDocument/2006/relationships" xmlns:p="http://schemas.openxmlformats.org/presentationml/2006/main">
   <p:cSld>
     <p:spTree>
@@ -7362,7 +8551,7 @@
 </p:sld>
 </file>
 
-<file path=ppt/slides/slide15.xml><?xml version="1.0" encoding="utf-8"?>
+<file path=ppt/slides/slide16.xml><?xml version="1.0" encoding="utf-8"?>
 <p:sld xmlns:a="http://schemas.openxmlformats.org/drawingml/2006/main" xmlns:r="http://schemas.openxmlformats.org/officeDocument/2006/relationships" xmlns:p="http://schemas.openxmlformats.org/presentationml/2006/main">
   <p:cSld>
     <p:spTree>
@@ -8660,7 +9849,7 @@
 </p:sld>
 </file>
 
-<file path=ppt/slides/slide16.xml><?xml version="1.0" encoding="utf-8"?>
+<file path=ppt/slides/slide17.xml><?xml version="1.0" encoding="utf-8"?>
 <p:sld xmlns:a="http://schemas.openxmlformats.org/drawingml/2006/main" xmlns:r="http://schemas.openxmlformats.org/officeDocument/2006/relationships" xmlns:p="http://schemas.openxmlformats.org/presentationml/2006/main">
   <p:cSld>
     <p:spTree>
@@ -8740,7 +9929,7 @@
 </p:sld>
 </file>
 
-<file path=ppt/slides/slide17.xml><?xml version="1.0" encoding="utf-8"?>
+<file path=ppt/slides/slide18.xml><?xml version="1.0" encoding="utf-8"?>
 <p:sld xmlns:a="http://schemas.openxmlformats.org/drawingml/2006/main" xmlns:r="http://schemas.openxmlformats.org/officeDocument/2006/relationships" xmlns:p="http://schemas.openxmlformats.org/presentationml/2006/main">
   <p:cSld>
     <p:spTree>
@@ -9849,7 +11038,7 @@
 </p:sld>
 </file>
 
-<file path=ppt/slides/slide18.xml><?xml version="1.0" encoding="utf-8"?>
+<file path=ppt/slides/slide19.xml><?xml version="1.0" encoding="utf-8"?>
 <p:sld xmlns:a="http://schemas.openxmlformats.org/drawingml/2006/main" xmlns:r="http://schemas.openxmlformats.org/officeDocument/2006/relationships" xmlns:p="http://schemas.openxmlformats.org/presentationml/2006/main">
   <p:cSld>
     <p:spTree>
@@ -11898,7 +13087,215 @@
 </p:sld>
 </file>
 
-<file path=ppt/slides/slide19.xml><?xml version="1.0" encoding="utf-8"?>
+<file path=ppt/slides/slide2.xml><?xml version="1.0" encoding="utf-8"?>
+<p:sld xmlns:a="http://schemas.openxmlformats.org/drawingml/2006/main" xmlns:r="http://schemas.openxmlformats.org/officeDocument/2006/relationships" xmlns:p="http://schemas.openxmlformats.org/presentationml/2006/main">
+  <p:cSld>
+    <p:spTree>
+      <p:nvGrpSpPr>
+        <p:cNvPr id="1" name=""/>
+        <p:cNvGrpSpPr/>
+        <p:nvPr/>
+      </p:nvGrpSpPr>
+      <p:grpSpPr>
+        <a:xfrm>
+          <a:off x="0" y="0"/>
+          <a:ext cx="0" cy="0"/>
+          <a:chOff x="0" y="0"/>
+          <a:chExt cx="0" cy="0"/>
+        </a:xfrm>
+      </p:grpSpPr>
+      <p:pic>
+        <p:nvPicPr>
+          <p:cNvPr id="1026" name="Picture 2" descr="https://lh5.googleusercontent.com/kx8tldwbc_8luwZK6pOebeCJPJ8jzv5yjEDxlTFnF7oypi1j7s7FCs4eUtH3TECL5OuNKWf5vc1opGaGoLiH_n8_qrQ8iM7-apQtzYzw-KM0VvTBK9taoK3cWdlPZjPY53RyUOQ">
+            <a:extLst>
+              <a:ext uri="{FF2B5EF4-FFF2-40B4-BE49-F238E27FC236}">
+                <a16:creationId xmlns:a16="http://schemas.microsoft.com/office/drawing/2014/main" id="{D5054D5C-1D80-457F-9A74-3ABF7B91F4FA}"/>
+              </a:ext>
+            </a:extLst>
+          </p:cNvPr>
+          <p:cNvPicPr>
+            <a:picLocks noChangeAspect="1" noChangeArrowheads="1"/>
+          </p:cNvPicPr>
+          <p:nvPr/>
+        </p:nvPicPr>
+        <p:blipFill>
+          <a:blip r:embed="rId2">
+            <a:extLst>
+              <a:ext uri="{28A0092B-C50C-407E-A947-70E740481C1C}">
+                <a14:useLocalDpi xmlns:a14="http://schemas.microsoft.com/office/drawing/2010/main" val="0"/>
+              </a:ext>
+            </a:extLst>
+          </a:blip>
+          <a:srcRect/>
+          <a:stretch>
+            <a:fillRect/>
+          </a:stretch>
+        </p:blipFill>
+        <p:spPr bwMode="auto">
+          <a:xfrm>
+            <a:off x="1625627" y="943797"/>
+            <a:ext cx="3714594" cy="2942253"/>
+          </a:xfrm>
+          <a:prstGeom prst="rect">
+            <a:avLst/>
+          </a:prstGeom>
+          <a:noFill/>
+          <a:extLst>
+            <a:ext uri="{909E8E84-426E-40DD-AFC4-6F175D3DCCD1}">
+              <a14:hiddenFill xmlns:a14="http://schemas.microsoft.com/office/drawing/2010/main">
+                <a:solidFill>
+                  <a:srgbClr val="FFFFFF"/>
+                </a:solidFill>
+              </a14:hiddenFill>
+            </a:ext>
+          </a:extLst>
+        </p:spPr>
+      </p:pic>
+      <p:sp>
+        <p:nvSpPr>
+          <p:cNvPr id="4" name="文字方塊 3">
+            <a:extLst>
+              <a:ext uri="{FF2B5EF4-FFF2-40B4-BE49-F238E27FC236}">
+                <a16:creationId xmlns:a16="http://schemas.microsoft.com/office/drawing/2014/main" id="{3A990441-582F-40B0-B3D5-372AAA628209}"/>
+              </a:ext>
+            </a:extLst>
+          </p:cNvPr>
+          <p:cNvSpPr txBox="1"/>
+          <p:nvPr/>
+        </p:nvSpPr>
+        <p:spPr>
+          <a:xfrm>
+            <a:off x="5868955" y="1828801"/>
+            <a:ext cx="5766319" cy="830997"/>
+          </a:xfrm>
+          <a:prstGeom prst="rect">
+            <a:avLst/>
+          </a:prstGeom>
+          <a:noFill/>
+        </p:spPr>
+        <p:txBody>
+          <a:bodyPr wrap="square" rtlCol="0">
+            <a:spAutoFit/>
+          </a:bodyPr>
+          <a:lstStyle/>
+          <a:p>
+            <a:r>
+              <a:rPr lang="zh-TW" altLang="en-US" sz="2400" dirty="0">
+                <a:solidFill>
+                  <a:schemeClr val="bg1"/>
+                </a:solidFill>
+                <a:latin typeface="Microsoft YaHei" panose="020B0503020204020204" pitchFamily="34" charset="-122"/>
+                <a:ea typeface="Microsoft YaHei" panose="020B0503020204020204" pitchFamily="34" charset="-122"/>
+              </a:rPr>
+              <a:t>想像一下，你手上有一個設計藍圖，你可以根據這個藍圖，蓋出任意外觀的房子</a:t>
+            </a:r>
+          </a:p>
+        </p:txBody>
+      </p:sp>
+      <p:pic>
+        <p:nvPicPr>
+          <p:cNvPr id="5" name="圖片 4">
+            <a:extLst>
+              <a:ext uri="{FF2B5EF4-FFF2-40B4-BE49-F238E27FC236}">
+                <a16:creationId xmlns:a16="http://schemas.microsoft.com/office/drawing/2014/main" id="{DE99E138-E66D-485B-8F48-BD3DDAEFF47F}"/>
+              </a:ext>
+            </a:extLst>
+          </p:cNvPr>
+          <p:cNvPicPr>
+            <a:picLocks noChangeAspect="1"/>
+          </p:cNvPicPr>
+          <p:nvPr/>
+        </p:nvPicPr>
+        <p:blipFill>
+          <a:blip r:embed="rId3"/>
+          <a:stretch>
+            <a:fillRect/>
+          </a:stretch>
+        </p:blipFill>
+        <p:spPr>
+          <a:xfrm>
+            <a:off x="328914" y="4443076"/>
+            <a:ext cx="2019475" cy="1928027"/>
+          </a:xfrm>
+          <a:prstGeom prst="rect">
+            <a:avLst/>
+          </a:prstGeom>
+        </p:spPr>
+      </p:pic>
+      <p:pic>
+        <p:nvPicPr>
+          <p:cNvPr id="6" name="圖片 5">
+            <a:extLst>
+              <a:ext uri="{FF2B5EF4-FFF2-40B4-BE49-F238E27FC236}">
+                <a16:creationId xmlns:a16="http://schemas.microsoft.com/office/drawing/2014/main" id="{377B39E2-EC0F-44E2-BBE0-5B9AAA5F02BD}"/>
+              </a:ext>
+            </a:extLst>
+          </p:cNvPr>
+          <p:cNvPicPr>
+            <a:picLocks noChangeAspect="1"/>
+          </p:cNvPicPr>
+          <p:nvPr/>
+        </p:nvPicPr>
+        <p:blipFill>
+          <a:blip r:embed="rId4"/>
+          <a:stretch>
+            <a:fillRect/>
+          </a:stretch>
+        </p:blipFill>
+        <p:spPr>
+          <a:xfrm>
+            <a:off x="2662978" y="4443076"/>
+            <a:ext cx="2377209" cy="1928027"/>
+          </a:xfrm>
+          <a:prstGeom prst="rect">
+            <a:avLst/>
+          </a:prstGeom>
+        </p:spPr>
+      </p:pic>
+      <p:pic>
+        <p:nvPicPr>
+          <p:cNvPr id="7" name="圖片 6">
+            <a:extLst>
+              <a:ext uri="{FF2B5EF4-FFF2-40B4-BE49-F238E27FC236}">
+                <a16:creationId xmlns:a16="http://schemas.microsoft.com/office/drawing/2014/main" id="{DDC6524A-BDE2-47C2-B455-7D958968D9D5}"/>
+              </a:ext>
+            </a:extLst>
+          </p:cNvPr>
+          <p:cNvPicPr>
+            <a:picLocks noChangeAspect="1"/>
+          </p:cNvPicPr>
+          <p:nvPr/>
+        </p:nvPicPr>
+        <p:blipFill>
+          <a:blip r:embed="rId5"/>
+          <a:stretch>
+            <a:fillRect/>
+          </a:stretch>
+        </p:blipFill>
+        <p:spPr>
+          <a:xfrm>
+            <a:off x="5510446" y="4443076"/>
+            <a:ext cx="2849301" cy="1928027"/>
+          </a:xfrm>
+          <a:prstGeom prst="rect">
+            <a:avLst/>
+          </a:prstGeom>
+        </p:spPr>
+      </p:pic>
+    </p:spTree>
+    <p:extLst>
+      <p:ext uri="{BB962C8B-B14F-4D97-AF65-F5344CB8AC3E}">
+        <p14:creationId xmlns:p14="http://schemas.microsoft.com/office/powerpoint/2010/main" val="4144058300"/>
+      </p:ext>
+    </p:extLst>
+  </p:cSld>
+  <p:clrMapOvr>
+    <a:masterClrMapping/>
+  </p:clrMapOvr>
+</p:sld>
+</file>
+
+<file path=ppt/slides/slide20.xml><?xml version="1.0" encoding="utf-8"?>
 <p:sld xmlns:a="http://schemas.openxmlformats.org/drawingml/2006/main" xmlns:r="http://schemas.openxmlformats.org/officeDocument/2006/relationships" xmlns:p="http://schemas.openxmlformats.org/presentationml/2006/main">
   <p:cSld>
     <p:spTree>
@@ -14561,215 +15958,7 @@
 </p:sld>
 </file>
 
-<file path=ppt/slides/slide2.xml><?xml version="1.0" encoding="utf-8"?>
-<p:sld xmlns:a="http://schemas.openxmlformats.org/drawingml/2006/main" xmlns:r="http://schemas.openxmlformats.org/officeDocument/2006/relationships" xmlns:p="http://schemas.openxmlformats.org/presentationml/2006/main">
-  <p:cSld>
-    <p:spTree>
-      <p:nvGrpSpPr>
-        <p:cNvPr id="1" name=""/>
-        <p:cNvGrpSpPr/>
-        <p:nvPr/>
-      </p:nvGrpSpPr>
-      <p:grpSpPr>
-        <a:xfrm>
-          <a:off x="0" y="0"/>
-          <a:ext cx="0" cy="0"/>
-          <a:chOff x="0" y="0"/>
-          <a:chExt cx="0" cy="0"/>
-        </a:xfrm>
-      </p:grpSpPr>
-      <p:pic>
-        <p:nvPicPr>
-          <p:cNvPr id="1026" name="Picture 2" descr="https://lh5.googleusercontent.com/kx8tldwbc_8luwZK6pOebeCJPJ8jzv5yjEDxlTFnF7oypi1j7s7FCs4eUtH3TECL5OuNKWf5vc1opGaGoLiH_n8_qrQ8iM7-apQtzYzw-KM0VvTBK9taoK3cWdlPZjPY53RyUOQ">
-            <a:extLst>
-              <a:ext uri="{FF2B5EF4-FFF2-40B4-BE49-F238E27FC236}">
-                <a16:creationId xmlns:a16="http://schemas.microsoft.com/office/drawing/2014/main" id="{D5054D5C-1D80-457F-9A74-3ABF7B91F4FA}"/>
-              </a:ext>
-            </a:extLst>
-          </p:cNvPr>
-          <p:cNvPicPr>
-            <a:picLocks noChangeAspect="1" noChangeArrowheads="1"/>
-          </p:cNvPicPr>
-          <p:nvPr/>
-        </p:nvPicPr>
-        <p:blipFill>
-          <a:blip r:embed="rId2">
-            <a:extLst>
-              <a:ext uri="{28A0092B-C50C-407E-A947-70E740481C1C}">
-                <a14:useLocalDpi xmlns:a14="http://schemas.microsoft.com/office/drawing/2010/main" val="0"/>
-              </a:ext>
-            </a:extLst>
-          </a:blip>
-          <a:srcRect/>
-          <a:stretch>
-            <a:fillRect/>
-          </a:stretch>
-        </p:blipFill>
-        <p:spPr bwMode="auto">
-          <a:xfrm>
-            <a:off x="1625627" y="943797"/>
-            <a:ext cx="3714594" cy="2942253"/>
-          </a:xfrm>
-          <a:prstGeom prst="rect">
-            <a:avLst/>
-          </a:prstGeom>
-          <a:noFill/>
-          <a:extLst>
-            <a:ext uri="{909E8E84-426E-40DD-AFC4-6F175D3DCCD1}">
-              <a14:hiddenFill xmlns:a14="http://schemas.microsoft.com/office/drawing/2010/main">
-                <a:solidFill>
-                  <a:srgbClr val="FFFFFF"/>
-                </a:solidFill>
-              </a14:hiddenFill>
-            </a:ext>
-          </a:extLst>
-        </p:spPr>
-      </p:pic>
-      <p:sp>
-        <p:nvSpPr>
-          <p:cNvPr id="4" name="文字方塊 3">
-            <a:extLst>
-              <a:ext uri="{FF2B5EF4-FFF2-40B4-BE49-F238E27FC236}">
-                <a16:creationId xmlns:a16="http://schemas.microsoft.com/office/drawing/2014/main" id="{3A990441-582F-40B0-B3D5-372AAA628209}"/>
-              </a:ext>
-            </a:extLst>
-          </p:cNvPr>
-          <p:cNvSpPr txBox="1"/>
-          <p:nvPr/>
-        </p:nvSpPr>
-        <p:spPr>
-          <a:xfrm>
-            <a:off x="5868955" y="1828801"/>
-            <a:ext cx="5766319" cy="830997"/>
-          </a:xfrm>
-          <a:prstGeom prst="rect">
-            <a:avLst/>
-          </a:prstGeom>
-          <a:noFill/>
-        </p:spPr>
-        <p:txBody>
-          <a:bodyPr wrap="square" rtlCol="0">
-            <a:spAutoFit/>
-          </a:bodyPr>
-          <a:lstStyle/>
-          <a:p>
-            <a:r>
-              <a:rPr lang="zh-TW" altLang="en-US" sz="2400" dirty="0">
-                <a:solidFill>
-                  <a:schemeClr val="bg1"/>
-                </a:solidFill>
-                <a:latin typeface="Microsoft YaHei" panose="020B0503020204020204" pitchFamily="34" charset="-122"/>
-                <a:ea typeface="Microsoft YaHei" panose="020B0503020204020204" pitchFamily="34" charset="-122"/>
-              </a:rPr>
-              <a:t>想像一下，你手上有一個設計藍圖，你可以根據這個藍圖，蓋出任意外觀的房子</a:t>
-            </a:r>
-          </a:p>
-        </p:txBody>
-      </p:sp>
-      <p:pic>
-        <p:nvPicPr>
-          <p:cNvPr id="5" name="圖片 4">
-            <a:extLst>
-              <a:ext uri="{FF2B5EF4-FFF2-40B4-BE49-F238E27FC236}">
-                <a16:creationId xmlns:a16="http://schemas.microsoft.com/office/drawing/2014/main" id="{DE99E138-E66D-485B-8F48-BD3DDAEFF47F}"/>
-              </a:ext>
-            </a:extLst>
-          </p:cNvPr>
-          <p:cNvPicPr>
-            <a:picLocks noChangeAspect="1"/>
-          </p:cNvPicPr>
-          <p:nvPr/>
-        </p:nvPicPr>
-        <p:blipFill>
-          <a:blip r:embed="rId3"/>
-          <a:stretch>
-            <a:fillRect/>
-          </a:stretch>
-        </p:blipFill>
-        <p:spPr>
-          <a:xfrm>
-            <a:off x="328914" y="4443076"/>
-            <a:ext cx="2019475" cy="1928027"/>
-          </a:xfrm>
-          <a:prstGeom prst="rect">
-            <a:avLst/>
-          </a:prstGeom>
-        </p:spPr>
-      </p:pic>
-      <p:pic>
-        <p:nvPicPr>
-          <p:cNvPr id="6" name="圖片 5">
-            <a:extLst>
-              <a:ext uri="{FF2B5EF4-FFF2-40B4-BE49-F238E27FC236}">
-                <a16:creationId xmlns:a16="http://schemas.microsoft.com/office/drawing/2014/main" id="{377B39E2-EC0F-44E2-BBE0-5B9AAA5F02BD}"/>
-              </a:ext>
-            </a:extLst>
-          </p:cNvPr>
-          <p:cNvPicPr>
-            <a:picLocks noChangeAspect="1"/>
-          </p:cNvPicPr>
-          <p:nvPr/>
-        </p:nvPicPr>
-        <p:blipFill>
-          <a:blip r:embed="rId4"/>
-          <a:stretch>
-            <a:fillRect/>
-          </a:stretch>
-        </p:blipFill>
-        <p:spPr>
-          <a:xfrm>
-            <a:off x="2662978" y="4443076"/>
-            <a:ext cx="2377209" cy="1928027"/>
-          </a:xfrm>
-          <a:prstGeom prst="rect">
-            <a:avLst/>
-          </a:prstGeom>
-        </p:spPr>
-      </p:pic>
-      <p:pic>
-        <p:nvPicPr>
-          <p:cNvPr id="7" name="圖片 6">
-            <a:extLst>
-              <a:ext uri="{FF2B5EF4-FFF2-40B4-BE49-F238E27FC236}">
-                <a16:creationId xmlns:a16="http://schemas.microsoft.com/office/drawing/2014/main" id="{DDC6524A-BDE2-47C2-B455-7D958968D9D5}"/>
-              </a:ext>
-            </a:extLst>
-          </p:cNvPr>
-          <p:cNvPicPr>
-            <a:picLocks noChangeAspect="1"/>
-          </p:cNvPicPr>
-          <p:nvPr/>
-        </p:nvPicPr>
-        <p:blipFill>
-          <a:blip r:embed="rId5"/>
-          <a:stretch>
-            <a:fillRect/>
-          </a:stretch>
-        </p:blipFill>
-        <p:spPr>
-          <a:xfrm>
-            <a:off x="5510446" y="4443076"/>
-            <a:ext cx="2849301" cy="1928027"/>
-          </a:xfrm>
-          <a:prstGeom prst="rect">
-            <a:avLst/>
-          </a:prstGeom>
-        </p:spPr>
-      </p:pic>
-    </p:spTree>
-    <p:extLst>
-      <p:ext uri="{BB962C8B-B14F-4D97-AF65-F5344CB8AC3E}">
-        <p14:creationId xmlns:p14="http://schemas.microsoft.com/office/powerpoint/2010/main" val="4144058300"/>
-      </p:ext>
-    </p:extLst>
-  </p:cSld>
-  <p:clrMapOvr>
-    <a:masterClrMapping/>
-  </p:clrMapOvr>
-</p:sld>
-</file>
-
-<file path=ppt/slides/slide20.xml><?xml version="1.0" encoding="utf-8"?>
+<file path=ppt/slides/slide21.xml><?xml version="1.0" encoding="utf-8"?>
 <p:sld xmlns:a="http://schemas.openxmlformats.org/drawingml/2006/main" xmlns:r="http://schemas.openxmlformats.org/officeDocument/2006/relationships" xmlns:p="http://schemas.openxmlformats.org/presentationml/2006/main">
   <p:cSld>
     <p:spTree>
@@ -16097,7 +17286,7 @@
 </p:sld>
 </file>
 
-<file path=ppt/slides/slide21.xml><?xml version="1.0" encoding="utf-8"?>
+<file path=ppt/slides/slide22.xml><?xml version="1.0" encoding="utf-8"?>
 <p:sld xmlns:a="http://schemas.openxmlformats.org/drawingml/2006/main" xmlns:r="http://schemas.openxmlformats.org/officeDocument/2006/relationships" xmlns:p="http://schemas.openxmlformats.org/presentationml/2006/main">
   <p:cSld>
     <p:spTree>
@@ -16196,7 +17385,7 @@
 </p:sld>
 </file>
 
-<file path=ppt/slides/slide22.xml><?xml version="1.0" encoding="utf-8"?>
+<file path=ppt/slides/slide23.xml><?xml version="1.0" encoding="utf-8"?>
 <p:sld xmlns:a="http://schemas.openxmlformats.org/drawingml/2006/main" xmlns:r="http://schemas.openxmlformats.org/officeDocument/2006/relationships" xmlns:p="http://schemas.openxmlformats.org/presentationml/2006/main">
   <p:cSld>
     <p:spTree>
@@ -19295,7 +20484,7 @@
 </p:sld>
 </file>
 
-<file path=ppt/slides/slide23.xml><?xml version="1.0" encoding="utf-8"?>
+<file path=ppt/slides/slide24.xml><?xml version="1.0" encoding="utf-8"?>
 <p:sld xmlns:a="http://schemas.openxmlformats.org/drawingml/2006/main" xmlns:r="http://schemas.openxmlformats.org/officeDocument/2006/relationships" xmlns:p="http://schemas.openxmlformats.org/presentationml/2006/main">
   <p:cSld>
     <p:spTree>
@@ -20700,7 +21889,7 @@
 </p:sld>
 </file>
 
-<file path=ppt/slides/slide24.xml><?xml version="1.0" encoding="utf-8"?>
+<file path=ppt/slides/slide25.xml><?xml version="1.0" encoding="utf-8"?>
 <p:sld xmlns:a="http://schemas.openxmlformats.org/drawingml/2006/main" xmlns:r="http://schemas.openxmlformats.org/officeDocument/2006/relationships" xmlns:p="http://schemas.openxmlformats.org/presentationml/2006/main">
   <p:cSld>
     <p:spTree>
@@ -22728,7 +23917,7 @@
 </p:sld>
 </file>
 
-<file path=ppt/slides/slide25.xml><?xml version="1.0" encoding="utf-8"?>
+<file path=ppt/slides/slide26.xml><?xml version="1.0" encoding="utf-8"?>
 <p:sld xmlns:a="http://schemas.openxmlformats.org/drawingml/2006/main" xmlns:r="http://schemas.openxmlformats.org/officeDocument/2006/relationships" xmlns:p="http://schemas.openxmlformats.org/presentationml/2006/main">
   <p:cSld>
     <p:spTree>
@@ -22808,7 +23997,7 @@
 </p:sld>
 </file>
 
-<file path=ppt/slides/slide26.xml><?xml version="1.0" encoding="utf-8"?>
+<file path=ppt/slides/slide27.xml><?xml version="1.0" encoding="utf-8"?>
 <p:sld xmlns:a="http://schemas.openxmlformats.org/drawingml/2006/main" xmlns:r="http://schemas.openxmlformats.org/officeDocument/2006/relationships" xmlns:p="http://schemas.openxmlformats.org/presentationml/2006/main">
   <p:cSld>
     <p:spTree>
@@ -24125,7 +25314,7 @@
 </p:sld>
 </file>
 
-<file path=ppt/slides/slide27.xml><?xml version="1.0" encoding="utf-8"?>
+<file path=ppt/slides/slide28.xml><?xml version="1.0" encoding="utf-8"?>
 <p:sld xmlns:a="http://schemas.openxmlformats.org/drawingml/2006/main" xmlns:r="http://schemas.openxmlformats.org/officeDocument/2006/relationships" xmlns:p="http://schemas.openxmlformats.org/presentationml/2006/main">
   <p:cSld>
     <p:spTree>
@@ -24443,7 +25632,7 @@
 </p:sld>
 </file>
 
-<file path=ppt/slides/slide28.xml><?xml version="1.0" encoding="utf-8"?>
+<file path=ppt/slides/slide29.xml><?xml version="1.0" encoding="utf-8"?>
 <p:sld xmlns:a="http://schemas.openxmlformats.org/drawingml/2006/main" xmlns:r="http://schemas.openxmlformats.org/officeDocument/2006/relationships" xmlns:p="http://schemas.openxmlformats.org/presentationml/2006/main">
   <p:cSld>
     <p:spTree>
@@ -25062,6 +26251,537 @@
 </file>
 
 <file path=ppt/slides/slide4.xml><?xml version="1.0" encoding="utf-8"?>
+<p:sld xmlns:a="http://schemas.openxmlformats.org/drawingml/2006/main" xmlns:r="http://schemas.openxmlformats.org/officeDocument/2006/relationships" xmlns:p="http://schemas.openxmlformats.org/presentationml/2006/main">
+  <p:cSld>
+    <p:spTree>
+      <p:nvGrpSpPr>
+        <p:cNvPr id="1" name=""/>
+        <p:cNvGrpSpPr/>
+        <p:nvPr/>
+      </p:nvGrpSpPr>
+      <p:grpSpPr>
+        <a:xfrm>
+          <a:off x="0" y="0"/>
+          <a:ext cx="0" cy="0"/>
+          <a:chOff x="0" y="0"/>
+          <a:chExt cx="0" cy="0"/>
+        </a:xfrm>
+      </p:grpSpPr>
+      <p:pic>
+        <p:nvPicPr>
+          <p:cNvPr id="4" name="圖片 3"/>
+          <p:cNvPicPr>
+            <a:picLocks noChangeAspect="1"/>
+          </p:cNvPicPr>
+          <p:nvPr/>
+        </p:nvPicPr>
+        <p:blipFill>
+          <a:blip r:embed="rId2">
+            <a:extLst>
+              <a:ext uri="{BEBA8EAE-BF5A-486C-A8C5-ECC9F3942E4B}">
+                <a14:imgProps xmlns:a14="http://schemas.microsoft.com/office/drawing/2010/main">
+                  <a14:imgLayer r:embed="rId3">
+                    <a14:imgEffect>
+                      <a14:backgroundRemoval t="9935" b="89739" l="3606" r="100000"/>
+                    </a14:imgEffect>
+                  </a14:imgLayer>
+                </a14:imgProps>
+              </a:ext>
+              <a:ext uri="{28A0092B-C50C-407E-A947-70E740481C1C}">
+                <a14:useLocalDpi xmlns:a14="http://schemas.microsoft.com/office/drawing/2010/main" val="0"/>
+              </a:ext>
+            </a:extLst>
+          </a:blip>
+          <a:stretch>
+            <a:fillRect/>
+          </a:stretch>
+        </p:blipFill>
+        <p:spPr>
+          <a:xfrm>
+            <a:off x="5110480" y="416561"/>
+            <a:ext cx="1342311" cy="1981200"/>
+          </a:xfrm>
+          <a:prstGeom prst="rect">
+            <a:avLst/>
+          </a:prstGeom>
+        </p:spPr>
+      </p:pic>
+      <p:sp>
+        <p:nvSpPr>
+          <p:cNvPr id="5" name="矩形 4">
+            <a:extLst>
+              <a:ext uri="{FF2B5EF4-FFF2-40B4-BE49-F238E27FC236}">
+                <a16:creationId xmlns:a16="http://schemas.microsoft.com/office/drawing/2014/main" id="{818E4DAE-D84A-4B2A-A65F-72D05AE36FAD}"/>
+              </a:ext>
+            </a:extLst>
+          </p:cNvPr>
+          <p:cNvSpPr/>
+          <p:nvPr/>
+        </p:nvSpPr>
+        <p:spPr>
+          <a:xfrm>
+            <a:off x="10170026" y="800914"/>
+            <a:ext cx="1582484" cy="1754326"/>
+          </a:xfrm>
+          <a:prstGeom prst="rect">
+            <a:avLst/>
+          </a:prstGeom>
+          <a:noFill/>
+        </p:spPr>
+        <p:txBody>
+          <a:bodyPr wrap="none" lIns="91440" tIns="45720" rIns="91440" bIns="45720">
+            <a:spAutoFit/>
+          </a:bodyPr>
+          <a:lstStyle/>
+          <a:p>
+            <a:pPr algn="ctr"/>
+            <a:r>
+              <a:rPr lang="zh-TW" altLang="en-US" sz="5400" b="1" spc="50" dirty="0">
+                <a:ln w="9525" cmpd="sng">
+                  <a:solidFill>
+                    <a:schemeClr val="accent1"/>
+                  </a:solidFill>
+                  <a:prstDash val="solid"/>
+                </a:ln>
+                <a:solidFill>
+                  <a:srgbClr val="70AD47">
+                    <a:tint val="1000"/>
+                  </a:srgbClr>
+                </a:solidFill>
+                <a:effectLst>
+                  <a:glow rad="38100">
+                    <a:schemeClr val="accent1">
+                      <a:alpha val="40000"/>
+                    </a:schemeClr>
+                  </a:glow>
+                </a:effectLst>
+              </a:rPr>
+              <a:t>類別</a:t>
+            </a:r>
+            <a:endParaRPr lang="en-US" altLang="zh-TW" sz="5400" b="1" cap="none" spc="50" dirty="0">
+              <a:ln w="9525" cmpd="sng">
+                <a:solidFill>
+                  <a:schemeClr val="accent1"/>
+                </a:solidFill>
+                <a:prstDash val="solid"/>
+              </a:ln>
+              <a:solidFill>
+                <a:srgbClr val="70AD47">
+                  <a:tint val="1000"/>
+                </a:srgbClr>
+              </a:solidFill>
+              <a:effectLst>
+                <a:glow rad="38100">
+                  <a:schemeClr val="accent1">
+                    <a:alpha val="40000"/>
+                  </a:schemeClr>
+                </a:glow>
+              </a:effectLst>
+            </a:endParaRPr>
+          </a:p>
+          <a:p>
+            <a:pPr algn="ctr"/>
+            <a:r>
+              <a:rPr lang="en-US" altLang="zh-TW" sz="5400" b="1" spc="50" dirty="0">
+                <a:ln w="9525" cmpd="sng">
+                  <a:solidFill>
+                    <a:schemeClr val="accent1"/>
+                  </a:solidFill>
+                  <a:prstDash val="solid"/>
+                </a:ln>
+                <a:solidFill>
+                  <a:srgbClr val="70AD47">
+                    <a:tint val="1000"/>
+                  </a:srgbClr>
+                </a:solidFill>
+                <a:effectLst>
+                  <a:glow rad="38100">
+                    <a:schemeClr val="accent1">
+                      <a:alpha val="40000"/>
+                    </a:schemeClr>
+                  </a:glow>
+                </a:effectLst>
+              </a:rPr>
+              <a:t>class</a:t>
+            </a:r>
+            <a:endParaRPr lang="zh-TW" altLang="en-US" sz="5400" b="1" cap="none" spc="50" dirty="0">
+              <a:ln w="9525" cmpd="sng">
+                <a:solidFill>
+                  <a:schemeClr val="accent1"/>
+                </a:solidFill>
+                <a:prstDash val="solid"/>
+              </a:ln>
+              <a:solidFill>
+                <a:srgbClr val="70AD47">
+                  <a:tint val="1000"/>
+                </a:srgbClr>
+              </a:solidFill>
+              <a:effectLst>
+                <a:glow rad="38100">
+                  <a:schemeClr val="accent1">
+                    <a:alpha val="40000"/>
+                  </a:schemeClr>
+                </a:glow>
+              </a:effectLst>
+            </a:endParaRPr>
+          </a:p>
+        </p:txBody>
+      </p:sp>
+      <p:cxnSp>
+        <p:nvCxnSpPr>
+          <p:cNvPr id="6" name="直線單箭頭接點 5">
+            <a:extLst>
+              <a:ext uri="{FF2B5EF4-FFF2-40B4-BE49-F238E27FC236}">
+                <a16:creationId xmlns:a16="http://schemas.microsoft.com/office/drawing/2014/main" id="{D6934D3A-BFA4-4DEE-A13B-631A5B87DA9C}"/>
+              </a:ext>
+            </a:extLst>
+          </p:cNvPr>
+          <p:cNvCxnSpPr>
+            <a:cxnSpLocks/>
+          </p:cNvCxnSpPr>
+          <p:nvPr/>
+        </p:nvCxnSpPr>
+        <p:spPr>
+          <a:xfrm>
+            <a:off x="6772226" y="1678077"/>
+            <a:ext cx="3012831" cy="0"/>
+          </a:xfrm>
+          <a:prstGeom prst="straightConnector1">
+            <a:avLst/>
+          </a:prstGeom>
+          <a:ln w="38100">
+            <a:solidFill>
+              <a:schemeClr val="bg1"/>
+            </a:solidFill>
+            <a:tailEnd type="triangle"/>
+          </a:ln>
+        </p:spPr>
+        <p:style>
+          <a:lnRef idx="1">
+            <a:schemeClr val="accent1"/>
+          </a:lnRef>
+          <a:fillRef idx="0">
+            <a:schemeClr val="accent1"/>
+          </a:fillRef>
+          <a:effectRef idx="0">
+            <a:schemeClr val="accent1"/>
+          </a:effectRef>
+          <a:fontRef idx="minor">
+            <a:schemeClr val="tx1"/>
+          </a:fontRef>
+        </p:style>
+      </p:cxnSp>
+      <p:sp>
+        <p:nvSpPr>
+          <p:cNvPr id="7" name="矩形 6">
+            <a:extLst>
+              <a:ext uri="{FF2B5EF4-FFF2-40B4-BE49-F238E27FC236}">
+                <a16:creationId xmlns:a16="http://schemas.microsoft.com/office/drawing/2014/main" id="{0A93D5EF-70F0-4EB7-B333-BF61CAEB0919}"/>
+              </a:ext>
+            </a:extLst>
+          </p:cNvPr>
+          <p:cNvSpPr/>
+          <p:nvPr/>
+        </p:nvSpPr>
+        <p:spPr>
+          <a:xfrm>
+            <a:off x="9973721" y="4326079"/>
+            <a:ext cx="2021707" cy="1754326"/>
+          </a:xfrm>
+          <a:prstGeom prst="rect">
+            <a:avLst/>
+          </a:prstGeom>
+          <a:noFill/>
+        </p:spPr>
+        <p:txBody>
+          <a:bodyPr wrap="none" lIns="91440" tIns="45720" rIns="91440" bIns="45720">
+            <a:spAutoFit/>
+          </a:bodyPr>
+          <a:lstStyle/>
+          <a:p>
+            <a:pPr algn="ctr"/>
+            <a:r>
+              <a:rPr lang="zh-TW" altLang="en-US" sz="5400" b="1" spc="50" dirty="0">
+                <a:ln w="9525" cmpd="sng">
+                  <a:solidFill>
+                    <a:schemeClr val="accent1"/>
+                  </a:solidFill>
+                  <a:prstDash val="solid"/>
+                </a:ln>
+                <a:solidFill>
+                  <a:srgbClr val="70AD47">
+                    <a:tint val="1000"/>
+                  </a:srgbClr>
+                </a:solidFill>
+                <a:effectLst>
+                  <a:glow rad="38100">
+                    <a:schemeClr val="accent1">
+                      <a:alpha val="40000"/>
+                    </a:schemeClr>
+                  </a:glow>
+                </a:effectLst>
+              </a:rPr>
+              <a:t>物件</a:t>
+            </a:r>
+            <a:endParaRPr lang="en-US" altLang="zh-TW" sz="5400" b="1" spc="50" dirty="0">
+              <a:ln w="9525" cmpd="sng">
+                <a:solidFill>
+                  <a:schemeClr val="accent1"/>
+                </a:solidFill>
+                <a:prstDash val="solid"/>
+              </a:ln>
+              <a:solidFill>
+                <a:srgbClr val="70AD47">
+                  <a:tint val="1000"/>
+                </a:srgbClr>
+              </a:solidFill>
+              <a:effectLst>
+                <a:glow rad="38100">
+                  <a:schemeClr val="accent1">
+                    <a:alpha val="40000"/>
+                  </a:schemeClr>
+                </a:glow>
+              </a:effectLst>
+            </a:endParaRPr>
+          </a:p>
+          <a:p>
+            <a:pPr algn="ctr"/>
+            <a:r>
+              <a:rPr lang="en-US" altLang="zh-TW" sz="5400" b="1" spc="50" dirty="0">
+                <a:ln w="9525" cmpd="sng">
+                  <a:solidFill>
+                    <a:schemeClr val="accent1"/>
+                  </a:solidFill>
+                  <a:prstDash val="solid"/>
+                </a:ln>
+                <a:solidFill>
+                  <a:srgbClr val="70AD47">
+                    <a:tint val="1000"/>
+                  </a:srgbClr>
+                </a:solidFill>
+                <a:effectLst>
+                  <a:glow rad="38100">
+                    <a:schemeClr val="accent1">
+                      <a:alpha val="40000"/>
+                    </a:schemeClr>
+                  </a:glow>
+                </a:effectLst>
+              </a:rPr>
+              <a:t>object</a:t>
+            </a:r>
+            <a:endParaRPr lang="zh-TW" altLang="en-US" sz="5400" b="1" cap="none" spc="50" dirty="0">
+              <a:ln w="9525" cmpd="sng">
+                <a:solidFill>
+                  <a:schemeClr val="accent1"/>
+                </a:solidFill>
+                <a:prstDash val="solid"/>
+              </a:ln>
+              <a:solidFill>
+                <a:srgbClr val="70AD47">
+                  <a:tint val="1000"/>
+                </a:srgbClr>
+              </a:solidFill>
+              <a:effectLst>
+                <a:glow rad="38100">
+                  <a:schemeClr val="accent1">
+                    <a:alpha val="40000"/>
+                  </a:schemeClr>
+                </a:glow>
+              </a:effectLst>
+            </a:endParaRPr>
+          </a:p>
+        </p:txBody>
+      </p:sp>
+      <p:cxnSp>
+        <p:nvCxnSpPr>
+          <p:cNvPr id="8" name="直線單箭頭接點 7">
+            <a:extLst>
+              <a:ext uri="{FF2B5EF4-FFF2-40B4-BE49-F238E27FC236}">
+                <a16:creationId xmlns:a16="http://schemas.microsoft.com/office/drawing/2014/main" id="{DAE56B52-2D23-40CB-B9CB-34BBDDAA21E1}"/>
+              </a:ext>
+            </a:extLst>
+          </p:cNvPr>
+          <p:cNvCxnSpPr>
+            <a:cxnSpLocks/>
+          </p:cNvCxnSpPr>
+          <p:nvPr/>
+        </p:nvCxnSpPr>
+        <p:spPr>
+          <a:xfrm>
+            <a:off x="9027264" y="5056777"/>
+            <a:ext cx="870857" cy="0"/>
+          </a:xfrm>
+          <a:prstGeom prst="straightConnector1">
+            <a:avLst/>
+          </a:prstGeom>
+          <a:ln w="38100">
+            <a:solidFill>
+              <a:schemeClr val="bg1"/>
+            </a:solidFill>
+            <a:tailEnd type="triangle"/>
+          </a:ln>
+        </p:spPr>
+        <p:style>
+          <a:lnRef idx="1">
+            <a:schemeClr val="accent1"/>
+          </a:lnRef>
+          <a:fillRef idx="0">
+            <a:schemeClr val="accent1"/>
+          </a:fillRef>
+          <a:effectRef idx="0">
+            <a:schemeClr val="accent1"/>
+          </a:effectRef>
+          <a:fontRef idx="minor">
+            <a:schemeClr val="tx1"/>
+          </a:fontRef>
+        </p:style>
+      </p:cxnSp>
+      <p:pic>
+        <p:nvPicPr>
+          <p:cNvPr id="9" name="圖片 8"/>
+          <p:cNvPicPr>
+            <a:picLocks noChangeAspect="1"/>
+          </p:cNvPicPr>
+          <p:nvPr/>
+        </p:nvPicPr>
+        <p:blipFill>
+          <a:blip r:embed="rId4">
+            <a:extLst>
+              <a:ext uri="{28A0092B-C50C-407E-A947-70E740481C1C}">
+                <a14:useLocalDpi xmlns:a14="http://schemas.microsoft.com/office/drawing/2010/main" val="0"/>
+              </a:ext>
+            </a:extLst>
+          </a:blip>
+          <a:stretch>
+            <a:fillRect/>
+          </a:stretch>
+        </p:blipFill>
+        <p:spPr>
+          <a:xfrm>
+            <a:off x="6452791" y="4060448"/>
+            <a:ext cx="2453640" cy="1992653"/>
+          </a:xfrm>
+          <a:prstGeom prst="rect">
+            <a:avLst/>
+          </a:prstGeom>
+        </p:spPr>
+      </p:pic>
+      <p:pic>
+        <p:nvPicPr>
+          <p:cNvPr id="10" name="圖片 9"/>
+          <p:cNvPicPr>
+            <a:picLocks noChangeAspect="1"/>
+          </p:cNvPicPr>
+          <p:nvPr/>
+        </p:nvPicPr>
+        <p:blipFill>
+          <a:blip r:embed="rId5">
+            <a:extLst>
+              <a:ext uri="{28A0092B-C50C-407E-A947-70E740481C1C}">
+                <a14:useLocalDpi xmlns:a14="http://schemas.microsoft.com/office/drawing/2010/main" val="0"/>
+              </a:ext>
+            </a:extLst>
+          </a:blip>
+          <a:stretch>
+            <a:fillRect/>
+          </a:stretch>
+        </p:blipFill>
+        <p:spPr>
+          <a:xfrm>
+            <a:off x="797560" y="3976323"/>
+            <a:ext cx="1708225" cy="2160905"/>
+          </a:xfrm>
+          <a:prstGeom prst="rect">
+            <a:avLst/>
+          </a:prstGeom>
+        </p:spPr>
+      </p:pic>
+      <p:pic>
+        <p:nvPicPr>
+          <p:cNvPr id="14" name="圖片 13"/>
+          <p:cNvPicPr>
+            <a:picLocks noChangeAspect="1"/>
+          </p:cNvPicPr>
+          <p:nvPr/>
+        </p:nvPicPr>
+        <p:blipFill>
+          <a:blip r:embed="rId6"/>
+          <a:stretch>
+            <a:fillRect/>
+          </a:stretch>
+        </p:blipFill>
+        <p:spPr>
+          <a:xfrm>
+            <a:off x="3288290" y="3962004"/>
+            <a:ext cx="2381995" cy="2175224"/>
+          </a:xfrm>
+          <a:prstGeom prst="rect">
+            <a:avLst/>
+          </a:prstGeom>
+        </p:spPr>
+      </p:pic>
+      <p:sp>
+        <p:nvSpPr>
+          <p:cNvPr id="15" name="文字方塊 14">
+            <a:extLst>
+              <a:ext uri="{FF2B5EF4-FFF2-40B4-BE49-F238E27FC236}">
+                <a16:creationId xmlns:a16="http://schemas.microsoft.com/office/drawing/2014/main" id="{3A990441-582F-40B0-B3D5-372AAA628209}"/>
+              </a:ext>
+            </a:extLst>
+          </p:cNvPr>
+          <p:cNvSpPr txBox="1"/>
+          <p:nvPr/>
+        </p:nvSpPr>
+        <p:spPr>
+          <a:xfrm>
+            <a:off x="3549052" y="1320801"/>
+            <a:ext cx="1561428" cy="461665"/>
+          </a:xfrm>
+          <a:prstGeom prst="rect">
+            <a:avLst/>
+          </a:prstGeom>
+          <a:noFill/>
+        </p:spPr>
+        <p:txBody>
+          <a:bodyPr wrap="square" rtlCol="0">
+            <a:spAutoFit/>
+          </a:bodyPr>
+          <a:lstStyle/>
+          <a:p>
+            <a:r>
+              <a:rPr lang="zh-TW" altLang="en-US" sz="2400" dirty="0" smtClean="0">
+                <a:solidFill>
+                  <a:schemeClr val="bg1"/>
+                </a:solidFill>
+                <a:latin typeface="Microsoft YaHei" panose="020B0503020204020204" pitchFamily="34" charset="-122"/>
+                <a:ea typeface="Microsoft YaHei" panose="020B0503020204020204" pitchFamily="34" charset="-122"/>
+              </a:rPr>
+              <a:t>人人果實</a:t>
+            </a:r>
+            <a:endParaRPr lang="zh-TW" altLang="en-US" sz="2400" dirty="0">
+              <a:solidFill>
+                <a:schemeClr val="bg1"/>
+              </a:solidFill>
+              <a:latin typeface="Microsoft YaHei" panose="020B0503020204020204" pitchFamily="34" charset="-122"/>
+              <a:ea typeface="Microsoft YaHei" panose="020B0503020204020204" pitchFamily="34" charset="-122"/>
+            </a:endParaRPr>
+          </a:p>
+        </p:txBody>
+      </p:sp>
+    </p:spTree>
+    <p:extLst>
+      <p:ext uri="{BB962C8B-B14F-4D97-AF65-F5344CB8AC3E}">
+        <p14:creationId xmlns:p14="http://schemas.microsoft.com/office/powerpoint/2010/main" val="3559463348"/>
+      </p:ext>
+    </p:extLst>
+  </p:cSld>
+  <p:clrMapOvr>
+    <a:masterClrMapping/>
+  </p:clrMapOvr>
+</p:sld>
+</file>
+
+<file path=ppt/slides/slide5.xml><?xml version="1.0" encoding="utf-8"?>
 <p:sld xmlns:a="http://schemas.openxmlformats.org/drawingml/2006/main" xmlns:r="http://schemas.openxmlformats.org/officeDocument/2006/relationships" xmlns:p="http://schemas.openxmlformats.org/presentationml/2006/main">
   <p:cSld>
     <p:spTree>
@@ -26830,7 +28550,7 @@
 </p:sld>
 </file>
 
-<file path=ppt/slides/slide5.xml><?xml version="1.0" encoding="utf-8"?>
+<file path=ppt/slides/slide6.xml><?xml version="1.0" encoding="utf-8"?>
 <p:sld xmlns:a="http://schemas.openxmlformats.org/drawingml/2006/main" xmlns:r="http://schemas.openxmlformats.org/officeDocument/2006/relationships" xmlns:p="http://schemas.openxmlformats.org/presentationml/2006/main">
   <p:cSld>
     <p:spTree>
@@ -27635,7 +29355,7 @@
 </p:sld>
 </file>
 
-<file path=ppt/slides/slide6.xml><?xml version="1.0" encoding="utf-8"?>
+<file path=ppt/slides/slide7.xml><?xml version="1.0" encoding="utf-8"?>
 <p:sld xmlns:a="http://schemas.openxmlformats.org/drawingml/2006/main" xmlns:r="http://schemas.openxmlformats.org/officeDocument/2006/relationships" xmlns:p="http://schemas.openxmlformats.org/presentationml/2006/main">
   <p:cSld>
     <p:spTree>
@@ -29348,7 +31068,7 @@
 </p:sld>
 </file>
 
-<file path=ppt/slides/slide7.xml><?xml version="1.0" encoding="utf-8"?>
+<file path=ppt/slides/slide8.xml><?xml version="1.0" encoding="utf-8"?>
 <p:sld xmlns:a="http://schemas.openxmlformats.org/drawingml/2006/main" xmlns:r="http://schemas.openxmlformats.org/officeDocument/2006/relationships" xmlns:p="http://schemas.openxmlformats.org/presentationml/2006/main">
   <p:cSld>
     <p:spTree>
@@ -29635,7 +31355,7 @@
 </p:sld>
 </file>
 
-<file path=ppt/slides/slide8.xml><?xml version="1.0" encoding="utf-8"?>
+<file path=ppt/slides/slide9.xml><?xml version="1.0" encoding="utf-8"?>
 <p:sld xmlns:a="http://schemas.openxmlformats.org/drawingml/2006/main" xmlns:r="http://schemas.openxmlformats.org/officeDocument/2006/relationships" xmlns:p="http://schemas.openxmlformats.org/presentationml/2006/main">
   <p:cSld>
     <p:spTree>
@@ -29686,1194 +31406,6 @@
     <p:extLst>
       <p:ext uri="{BB962C8B-B14F-4D97-AF65-F5344CB8AC3E}">
         <p14:creationId xmlns:p14="http://schemas.microsoft.com/office/powerpoint/2010/main" val="304641516"/>
-      </p:ext>
-    </p:extLst>
-  </p:cSld>
-  <p:clrMapOvr>
-    <a:masterClrMapping/>
-  </p:clrMapOvr>
-</p:sld>
-</file>
-
-<file path=ppt/slides/slide9.xml><?xml version="1.0" encoding="utf-8"?>
-<p:sld xmlns:a="http://schemas.openxmlformats.org/drawingml/2006/main" xmlns:r="http://schemas.openxmlformats.org/officeDocument/2006/relationships" xmlns:p="http://schemas.openxmlformats.org/presentationml/2006/main">
-  <p:cSld>
-    <p:spTree>
-      <p:nvGrpSpPr>
-        <p:cNvPr id="1" name=""/>
-        <p:cNvGrpSpPr/>
-        <p:nvPr/>
-      </p:nvGrpSpPr>
-      <p:grpSpPr>
-        <a:xfrm>
-          <a:off x="0" y="0"/>
-          <a:ext cx="0" cy="0"/>
-          <a:chOff x="0" y="0"/>
-          <a:chExt cx="0" cy="0"/>
-        </a:xfrm>
-      </p:grpSpPr>
-      <p:sp>
-        <p:nvSpPr>
-          <p:cNvPr id="3" name="標題 1">
-            <a:extLst>
-              <a:ext uri="{FF2B5EF4-FFF2-40B4-BE49-F238E27FC236}">
-                <a16:creationId xmlns:a16="http://schemas.microsoft.com/office/drawing/2014/main" id="{0F5E33BC-9F02-487D-AE79-42ACA7C859E5}"/>
-              </a:ext>
-            </a:extLst>
-          </p:cNvPr>
-          <p:cNvSpPr>
-            <a:spLocks noGrp="1"/>
-          </p:cNvSpPr>
-          <p:nvPr>
-            <p:ph type="title"/>
-          </p:nvPr>
-        </p:nvSpPr>
-        <p:spPr>
-          <a:xfrm>
-            <a:off x="82421" y="136525"/>
-            <a:ext cx="10515600" cy="614589"/>
-          </a:xfrm>
-        </p:spPr>
-        <p:txBody>
-          <a:bodyPr>
-            <a:normAutofit fontScale="90000"/>
-          </a:bodyPr>
-          <a:lstStyle/>
-          <a:p>
-            <a:r>
-              <a:rPr lang="en-US" altLang="zh-TW" dirty="0">
-                <a:latin typeface="Microsoft YaHei" panose="020B0503020204020204" pitchFamily="34" charset="-122"/>
-                <a:ea typeface="Microsoft YaHei" panose="020B0503020204020204" pitchFamily="34" charset="-122"/>
-              </a:rPr>
-              <a:t>Python</a:t>
-            </a:r>
-            <a:r>
-              <a:rPr lang="zh-TW" altLang="en-US" dirty="0">
-                <a:latin typeface="Microsoft YaHei" panose="020B0503020204020204" pitchFamily="34" charset="-122"/>
-                <a:ea typeface="Microsoft YaHei" panose="020B0503020204020204" pitchFamily="34" charset="-122"/>
-              </a:rPr>
-              <a:t> 資料型態</a:t>
-            </a:r>
-          </a:p>
-        </p:txBody>
-      </p:sp>
-      <p:sp>
-        <p:nvSpPr>
-          <p:cNvPr id="9" name="矩形 8">
-            <a:extLst>
-              <a:ext uri="{FF2B5EF4-FFF2-40B4-BE49-F238E27FC236}">
-                <a16:creationId xmlns:a16="http://schemas.microsoft.com/office/drawing/2014/main" id="{47CDA9F8-1BA5-4487-A1AE-E43363B14943}"/>
-              </a:ext>
-            </a:extLst>
-          </p:cNvPr>
-          <p:cNvSpPr/>
-          <p:nvPr/>
-        </p:nvSpPr>
-        <p:spPr>
-          <a:xfrm>
-            <a:off x="903833" y="673522"/>
-            <a:ext cx="4371431" cy="461665"/>
-          </a:xfrm>
-          <a:prstGeom prst="rect">
-            <a:avLst/>
-          </a:prstGeom>
-          <a:noFill/>
-        </p:spPr>
-        <p:txBody>
-          <a:bodyPr wrap="square" lIns="91440" tIns="45720" rIns="91440" bIns="45720">
-            <a:spAutoFit/>
-          </a:bodyPr>
-          <a:lstStyle/>
-          <a:p>
-            <a:pPr algn="ctr"/>
-            <a:r>
-              <a:rPr lang="zh-TW" altLang="en-US" sz="2400" b="1" spc="50" dirty="0">
-                <a:ln w="9525" cmpd="sng">
-                  <a:solidFill>
-                    <a:schemeClr val="accent1"/>
-                  </a:solidFill>
-                  <a:prstDash val="solid"/>
-                </a:ln>
-                <a:solidFill>
-                  <a:srgbClr val="70AD47">
-                    <a:tint val="1000"/>
-                  </a:srgbClr>
-                </a:solidFill>
-                <a:effectLst>
-                  <a:glow rad="38100">
-                    <a:schemeClr val="accent1">
-                      <a:alpha val="40000"/>
-                    </a:schemeClr>
-                  </a:glow>
-                </a:effectLst>
-              </a:rPr>
-              <a:t>類</a:t>
-            </a:r>
-            <a:r>
-              <a:rPr lang="zh-TW" altLang="en-US" sz="2400" b="1" cap="none" spc="50" dirty="0">
-                <a:ln w="9525" cmpd="sng">
-                  <a:solidFill>
-                    <a:schemeClr val="accent1"/>
-                  </a:solidFill>
-                  <a:prstDash val="solid"/>
-                </a:ln>
-                <a:solidFill>
-                  <a:srgbClr val="70AD47">
-                    <a:tint val="1000"/>
-                  </a:srgbClr>
-                </a:solidFill>
-                <a:effectLst>
-                  <a:glow rad="38100">
-                    <a:schemeClr val="accent1">
-                      <a:alpha val="40000"/>
-                    </a:schemeClr>
-                  </a:glow>
-                </a:effectLst>
-              </a:rPr>
-              <a:t>別</a:t>
-            </a:r>
-            <a:r>
-              <a:rPr lang="en-US" altLang="zh-TW" sz="2400" b="1" cap="none" spc="50" dirty="0">
-                <a:ln w="9525" cmpd="sng">
-                  <a:solidFill>
-                    <a:schemeClr val="accent1"/>
-                  </a:solidFill>
-                  <a:prstDash val="solid"/>
-                </a:ln>
-                <a:solidFill>
-                  <a:srgbClr val="70AD47">
-                    <a:tint val="1000"/>
-                  </a:srgbClr>
-                </a:solidFill>
-                <a:effectLst>
-                  <a:glow rad="38100">
-                    <a:schemeClr val="accent1">
-                      <a:alpha val="40000"/>
-                    </a:schemeClr>
-                  </a:glow>
-                </a:effectLst>
-              </a:rPr>
-              <a:t>(</a:t>
-            </a:r>
-            <a:r>
-              <a:rPr lang="en-US" altLang="zh-TW" sz="2400" b="1" spc="50" dirty="0">
-                <a:ln w="9525" cmpd="sng">
-                  <a:solidFill>
-                    <a:schemeClr val="accent1"/>
-                  </a:solidFill>
-                  <a:prstDash val="solid"/>
-                </a:ln>
-                <a:solidFill>
-                  <a:srgbClr val="70AD47">
-                    <a:tint val="1000"/>
-                  </a:srgbClr>
-                </a:solidFill>
-                <a:effectLst>
-                  <a:glow rad="38100">
-                    <a:schemeClr val="accent1">
-                      <a:alpha val="40000"/>
-                    </a:schemeClr>
-                  </a:glow>
-                </a:effectLst>
-              </a:rPr>
-              <a:t>class</a:t>
-            </a:r>
-            <a:r>
-              <a:rPr lang="en-US" altLang="zh-TW" sz="2400" b="1" cap="none" spc="50" dirty="0">
-                <a:ln w="9525" cmpd="sng">
-                  <a:solidFill>
-                    <a:schemeClr val="accent1"/>
-                  </a:solidFill>
-                  <a:prstDash val="solid"/>
-                </a:ln>
-                <a:solidFill>
-                  <a:srgbClr val="70AD47">
-                    <a:tint val="1000"/>
-                  </a:srgbClr>
-                </a:solidFill>
-                <a:effectLst>
-                  <a:glow rad="38100">
-                    <a:schemeClr val="accent1">
-                      <a:alpha val="40000"/>
-                    </a:schemeClr>
-                  </a:glow>
-                </a:effectLst>
-              </a:rPr>
-              <a:t>)</a:t>
-            </a:r>
-            <a:endParaRPr lang="zh-TW" altLang="en-US" sz="2400" b="1" cap="none" spc="50" dirty="0">
-              <a:ln w="9525" cmpd="sng">
-                <a:solidFill>
-                  <a:schemeClr val="accent1"/>
-                </a:solidFill>
-                <a:prstDash val="solid"/>
-              </a:ln>
-              <a:solidFill>
-                <a:srgbClr val="70AD47">
-                  <a:tint val="1000"/>
-                </a:srgbClr>
-              </a:solidFill>
-              <a:effectLst>
-                <a:glow rad="38100">
-                  <a:schemeClr val="accent1">
-                    <a:alpha val="40000"/>
-                  </a:schemeClr>
-                </a:glow>
-              </a:effectLst>
-            </a:endParaRPr>
-          </a:p>
-        </p:txBody>
-      </p:sp>
-      <p:sp>
-        <p:nvSpPr>
-          <p:cNvPr id="10" name="矩形 9">
-            <a:extLst>
-              <a:ext uri="{FF2B5EF4-FFF2-40B4-BE49-F238E27FC236}">
-                <a16:creationId xmlns:a16="http://schemas.microsoft.com/office/drawing/2014/main" id="{FD2CDC5E-8F7C-4479-82AE-B4AB0DF0D0DF}"/>
-              </a:ext>
-            </a:extLst>
-          </p:cNvPr>
-          <p:cNvSpPr/>
-          <p:nvPr/>
-        </p:nvSpPr>
-        <p:spPr>
-          <a:xfrm>
-            <a:off x="4072016" y="697354"/>
-            <a:ext cx="4371431" cy="461665"/>
-          </a:xfrm>
-          <a:prstGeom prst="rect">
-            <a:avLst/>
-          </a:prstGeom>
-          <a:noFill/>
-        </p:spPr>
-        <p:txBody>
-          <a:bodyPr wrap="square" lIns="91440" tIns="45720" rIns="91440" bIns="45720">
-            <a:spAutoFit/>
-          </a:bodyPr>
-          <a:lstStyle/>
-          <a:p>
-            <a:pPr algn="ctr"/>
-            <a:r>
-              <a:rPr lang="zh-TW" altLang="en-US" sz="2400" b="1" spc="50" dirty="0">
-                <a:ln w="9525" cmpd="sng">
-                  <a:solidFill>
-                    <a:schemeClr val="accent1"/>
-                  </a:solidFill>
-                  <a:prstDash val="solid"/>
-                </a:ln>
-                <a:solidFill>
-                  <a:srgbClr val="70AD47">
-                    <a:tint val="1000"/>
-                  </a:srgbClr>
-                </a:solidFill>
-                <a:effectLst>
-                  <a:glow rad="38100">
-                    <a:schemeClr val="accent1">
-                      <a:alpha val="40000"/>
-                    </a:schemeClr>
-                  </a:glow>
-                </a:effectLst>
-              </a:rPr>
-              <a:t>物件</a:t>
-            </a:r>
-            <a:r>
-              <a:rPr lang="en-US" altLang="zh-TW" sz="2400" b="1" cap="none" spc="50" dirty="0">
-                <a:ln w="9525" cmpd="sng">
-                  <a:solidFill>
-                    <a:schemeClr val="accent1"/>
-                  </a:solidFill>
-                  <a:prstDash val="solid"/>
-                </a:ln>
-                <a:solidFill>
-                  <a:srgbClr val="70AD47">
-                    <a:tint val="1000"/>
-                  </a:srgbClr>
-                </a:solidFill>
-                <a:effectLst>
-                  <a:glow rad="38100">
-                    <a:schemeClr val="accent1">
-                      <a:alpha val="40000"/>
-                    </a:schemeClr>
-                  </a:glow>
-                </a:effectLst>
-              </a:rPr>
-              <a:t>(</a:t>
-            </a:r>
-            <a:r>
-              <a:rPr lang="en-US" altLang="zh-TW" sz="2400" b="1" spc="50" dirty="0">
-                <a:ln w="9525" cmpd="sng">
-                  <a:solidFill>
-                    <a:schemeClr val="accent1"/>
-                  </a:solidFill>
-                  <a:prstDash val="solid"/>
-                </a:ln>
-                <a:solidFill>
-                  <a:srgbClr val="70AD47">
-                    <a:tint val="1000"/>
-                  </a:srgbClr>
-                </a:solidFill>
-                <a:effectLst>
-                  <a:glow rad="38100">
-                    <a:schemeClr val="accent1">
-                      <a:alpha val="40000"/>
-                    </a:schemeClr>
-                  </a:glow>
-                </a:effectLst>
-              </a:rPr>
-              <a:t>object</a:t>
-            </a:r>
-            <a:r>
-              <a:rPr lang="en-US" altLang="zh-TW" sz="2400" b="1" cap="none" spc="50" dirty="0">
-                <a:ln w="9525" cmpd="sng">
-                  <a:solidFill>
-                    <a:schemeClr val="accent1"/>
-                  </a:solidFill>
-                  <a:prstDash val="solid"/>
-                </a:ln>
-                <a:solidFill>
-                  <a:srgbClr val="70AD47">
-                    <a:tint val="1000"/>
-                  </a:srgbClr>
-                </a:solidFill>
-                <a:effectLst>
-                  <a:glow rad="38100">
-                    <a:schemeClr val="accent1">
-                      <a:alpha val="40000"/>
-                    </a:schemeClr>
-                  </a:glow>
-                </a:effectLst>
-              </a:rPr>
-              <a:t>)</a:t>
-            </a:r>
-            <a:endParaRPr lang="zh-TW" altLang="en-US" sz="2400" b="1" cap="none" spc="50" dirty="0">
-              <a:ln w="9525" cmpd="sng">
-                <a:solidFill>
-                  <a:schemeClr val="accent1"/>
-                </a:solidFill>
-                <a:prstDash val="solid"/>
-              </a:ln>
-              <a:solidFill>
-                <a:srgbClr val="70AD47">
-                  <a:tint val="1000"/>
-                </a:srgbClr>
-              </a:solidFill>
-              <a:effectLst>
-                <a:glow rad="38100">
-                  <a:schemeClr val="accent1">
-                    <a:alpha val="40000"/>
-                  </a:schemeClr>
-                </a:glow>
-              </a:effectLst>
-            </a:endParaRPr>
-          </a:p>
-        </p:txBody>
-      </p:sp>
-      <p:sp>
-        <p:nvSpPr>
-          <p:cNvPr id="12" name="矩形 11">
-            <a:extLst>
-              <a:ext uri="{FF2B5EF4-FFF2-40B4-BE49-F238E27FC236}">
-                <a16:creationId xmlns:a16="http://schemas.microsoft.com/office/drawing/2014/main" id="{486D5593-3F8D-48B9-A2B2-A58AF8C3CE7C}"/>
-              </a:ext>
-            </a:extLst>
-          </p:cNvPr>
-          <p:cNvSpPr/>
-          <p:nvPr/>
-        </p:nvSpPr>
-        <p:spPr>
-          <a:xfrm>
-            <a:off x="7270062" y="706363"/>
-            <a:ext cx="4371431" cy="461665"/>
-          </a:xfrm>
-          <a:prstGeom prst="rect">
-            <a:avLst/>
-          </a:prstGeom>
-          <a:noFill/>
-        </p:spPr>
-        <p:txBody>
-          <a:bodyPr wrap="square" lIns="91440" tIns="45720" rIns="91440" bIns="45720">
-            <a:spAutoFit/>
-          </a:bodyPr>
-          <a:lstStyle/>
-          <a:p>
-            <a:pPr algn="ctr"/>
-            <a:r>
-              <a:rPr lang="zh-TW" altLang="en-US" sz="2400" b="1" spc="50" dirty="0">
-                <a:ln w="9525" cmpd="sng">
-                  <a:solidFill>
-                    <a:schemeClr val="accent1"/>
-                  </a:solidFill>
-                  <a:prstDash val="solid"/>
-                </a:ln>
-                <a:solidFill>
-                  <a:srgbClr val="70AD47">
-                    <a:tint val="1000"/>
-                  </a:srgbClr>
-                </a:solidFill>
-                <a:effectLst>
-                  <a:glow rad="38100">
-                    <a:schemeClr val="accent1">
-                      <a:alpha val="40000"/>
-                    </a:schemeClr>
-                  </a:glow>
-                </a:effectLst>
-              </a:rPr>
-              <a:t>描述：</a:t>
-            </a:r>
-            <a:r>
-              <a:rPr lang="en-US" altLang="zh-TW" sz="2400" b="1" spc="50" dirty="0">
-                <a:ln w="9525" cmpd="sng">
-                  <a:solidFill>
-                    <a:schemeClr val="accent1"/>
-                  </a:solidFill>
-                  <a:prstDash val="solid"/>
-                </a:ln>
-                <a:solidFill>
-                  <a:srgbClr val="70AD47">
-                    <a:tint val="1000"/>
-                  </a:srgbClr>
-                </a:solidFill>
-                <a:effectLst>
-                  <a:glow rad="38100">
-                    <a:schemeClr val="accent1">
-                      <a:alpha val="40000"/>
-                    </a:schemeClr>
-                  </a:glow>
-                </a:effectLst>
-              </a:rPr>
-              <a:t>value</a:t>
-            </a:r>
-            <a:endParaRPr lang="zh-TW" altLang="en-US" sz="2400" b="1" spc="50" dirty="0">
-              <a:ln w="9525" cmpd="sng">
-                <a:solidFill>
-                  <a:schemeClr val="accent1"/>
-                </a:solidFill>
-                <a:prstDash val="solid"/>
-              </a:ln>
-              <a:solidFill>
-                <a:srgbClr val="70AD47">
-                  <a:tint val="1000"/>
-                </a:srgbClr>
-              </a:solidFill>
-              <a:effectLst>
-                <a:glow rad="38100">
-                  <a:schemeClr val="accent1">
-                    <a:alpha val="40000"/>
-                  </a:schemeClr>
-                </a:glow>
-              </a:effectLst>
-            </a:endParaRPr>
-          </a:p>
-        </p:txBody>
-      </p:sp>
-      <p:graphicFrame>
-        <p:nvGraphicFramePr>
-          <p:cNvPr id="13" name="表格 12">
-            <a:extLst>
-              <a:ext uri="{FF2B5EF4-FFF2-40B4-BE49-F238E27FC236}">
-                <a16:creationId xmlns:a16="http://schemas.microsoft.com/office/drawing/2014/main" id="{ED3BA8BD-C2EA-4371-B3BF-FD4C5FC74C1F}"/>
-              </a:ext>
-            </a:extLst>
-          </p:cNvPr>
-          <p:cNvGraphicFramePr>
-            <a:graphicFrameLocks noGrp="1"/>
-          </p:cNvGraphicFramePr>
-          <p:nvPr>
-            <p:extLst>
-              <p:ext uri="{D42A27DB-BD31-4B8C-83A1-F6EECF244321}">
-                <p14:modId xmlns:p14="http://schemas.microsoft.com/office/powerpoint/2010/main" val="1946820949"/>
-              </p:ext>
-            </p:extLst>
-          </p:nvPr>
-        </p:nvGraphicFramePr>
-        <p:xfrm>
-          <a:off x="1551490" y="1177037"/>
-          <a:ext cx="9412482" cy="2286000"/>
-        </p:xfrm>
-        <a:graphic>
-          <a:graphicData uri="http://schemas.openxmlformats.org/drawingml/2006/table">
-            <a:tbl>
-              <a:tblPr firstRow="1" bandRow="1">
-                <a:tableStyleId>{5C22544A-7EE6-4342-B048-85BDC9FD1C3A}</a:tableStyleId>
-              </a:tblPr>
-              <a:tblGrid>
-                <a:gridCol w="3137494">
-                  <a:extLst>
-                    <a:ext uri="{9D8B030D-6E8A-4147-A177-3AD203B41FA5}">
-                      <a16:colId xmlns:a16="http://schemas.microsoft.com/office/drawing/2014/main" val="3200434382"/>
-                    </a:ext>
-                  </a:extLst>
-                </a:gridCol>
-                <a:gridCol w="3137494">
-                  <a:extLst>
-                    <a:ext uri="{9D8B030D-6E8A-4147-A177-3AD203B41FA5}">
-                      <a16:colId xmlns:a16="http://schemas.microsoft.com/office/drawing/2014/main" val="21363107"/>
-                    </a:ext>
-                  </a:extLst>
-                </a:gridCol>
-                <a:gridCol w="3137494">
-                  <a:extLst>
-                    <a:ext uri="{9D8B030D-6E8A-4147-A177-3AD203B41FA5}">
-                      <a16:colId xmlns:a16="http://schemas.microsoft.com/office/drawing/2014/main" val="505792392"/>
-                    </a:ext>
-                  </a:extLst>
-                </a:gridCol>
-              </a:tblGrid>
-              <a:tr h="370840">
-                <a:tc>
-                  <a:txBody>
-                    <a:bodyPr/>
-                    <a:lstStyle/>
-                    <a:p>
-                      <a:pPr algn="ctr"/>
-                      <a:r>
-                        <a:rPr lang="en-US" altLang="zh-TW" sz="2400" b="0" dirty="0">
-                          <a:solidFill>
-                            <a:schemeClr val="tx1"/>
-                          </a:solidFill>
-                          <a:latin typeface="Microsoft YaHei" panose="020B0503020204020204" pitchFamily="34" charset="-122"/>
-                          <a:ea typeface="Microsoft YaHei" panose="020B0503020204020204" pitchFamily="34" charset="-122"/>
-                        </a:rPr>
-                        <a:t>integer</a:t>
-                      </a:r>
-                      <a:endParaRPr lang="zh-TW" altLang="en-US" sz="2400" b="0" dirty="0">
-                        <a:solidFill>
-                          <a:schemeClr val="tx1"/>
-                        </a:solidFill>
-                        <a:latin typeface="Microsoft YaHei" panose="020B0503020204020204" pitchFamily="34" charset="-122"/>
-                        <a:ea typeface="Microsoft YaHei" panose="020B0503020204020204" pitchFamily="34" charset="-122"/>
-                      </a:endParaRPr>
-                    </a:p>
-                  </a:txBody>
-                  <a:tcPr>
-                    <a:solidFill>
-                      <a:schemeClr val="bg1">
-                        <a:lumMod val="75000"/>
-                      </a:schemeClr>
-                    </a:solidFill>
-                  </a:tcPr>
-                </a:tc>
-                <a:tc>
-                  <a:txBody>
-                    <a:bodyPr/>
-                    <a:lstStyle/>
-                    <a:p>
-                      <a:pPr algn="ctr"/>
-                      <a:r>
-                        <a:rPr lang="zh-TW" altLang="en-US" sz="2400" b="0" dirty="0">
-                          <a:solidFill>
-                            <a:schemeClr val="tx1"/>
-                          </a:solidFill>
-                          <a:latin typeface="Microsoft YaHei" panose="020B0503020204020204" pitchFamily="34" charset="-122"/>
-                          <a:ea typeface="Microsoft YaHei" panose="020B0503020204020204" pitchFamily="34" charset="-122"/>
-                        </a:rPr>
-                        <a:t>整數</a:t>
-                      </a:r>
-                      <a:r>
-                        <a:rPr lang="en-US" altLang="zh-TW" sz="2400" b="0" dirty="0">
-                          <a:solidFill>
-                            <a:schemeClr val="tx1"/>
-                          </a:solidFill>
-                          <a:latin typeface="Microsoft YaHei" panose="020B0503020204020204" pitchFamily="34" charset="-122"/>
-                          <a:ea typeface="Microsoft YaHei" panose="020B0503020204020204" pitchFamily="34" charset="-122"/>
-                        </a:rPr>
-                        <a:t>1</a:t>
-                      </a:r>
-                      <a:r>
-                        <a:rPr lang="zh-TW" altLang="en-US" sz="2400" b="0" dirty="0">
-                          <a:solidFill>
-                            <a:schemeClr val="tx1"/>
-                          </a:solidFill>
-                          <a:latin typeface="Microsoft YaHei" panose="020B0503020204020204" pitchFamily="34" charset="-122"/>
-                          <a:ea typeface="Microsoft YaHei" panose="020B0503020204020204" pitchFamily="34" charset="-122"/>
-                        </a:rPr>
-                        <a:t>號</a:t>
-                      </a:r>
-                    </a:p>
-                  </a:txBody>
-                  <a:tcPr>
-                    <a:solidFill>
-                      <a:schemeClr val="bg1">
-                        <a:lumMod val="75000"/>
-                      </a:schemeClr>
-                    </a:solidFill>
-                  </a:tcPr>
-                </a:tc>
-                <a:tc>
-                  <a:txBody>
-                    <a:bodyPr/>
-                    <a:lstStyle/>
-                    <a:p>
-                      <a:pPr algn="ctr"/>
-                      <a:r>
-                        <a:rPr lang="en-US" altLang="zh-TW" sz="2400" b="0" dirty="0">
-                          <a:solidFill>
-                            <a:schemeClr val="tx1"/>
-                          </a:solidFill>
-                          <a:latin typeface="Microsoft YaHei" panose="020B0503020204020204" pitchFamily="34" charset="-122"/>
-                          <a:ea typeface="Microsoft YaHei" panose="020B0503020204020204" pitchFamily="34" charset="-122"/>
-                        </a:rPr>
-                        <a:t>10</a:t>
-                      </a:r>
-                      <a:endParaRPr lang="zh-TW" altLang="en-US" sz="2400" b="0" dirty="0">
-                        <a:solidFill>
-                          <a:schemeClr val="tx1"/>
-                        </a:solidFill>
-                        <a:latin typeface="Microsoft YaHei" panose="020B0503020204020204" pitchFamily="34" charset="-122"/>
-                        <a:ea typeface="Microsoft YaHei" panose="020B0503020204020204" pitchFamily="34" charset="-122"/>
-                      </a:endParaRPr>
-                    </a:p>
-                  </a:txBody>
-                  <a:tcPr>
-                    <a:solidFill>
-                      <a:schemeClr val="bg1">
-                        <a:lumMod val="75000"/>
-                      </a:schemeClr>
-                    </a:solidFill>
-                  </a:tcPr>
-                </a:tc>
-                <a:extLst>
-                  <a:ext uri="{0D108BD9-81ED-4DB2-BD59-A6C34878D82A}">
-                    <a16:rowId xmlns:a16="http://schemas.microsoft.com/office/drawing/2014/main" val="4202669326"/>
-                  </a:ext>
-                </a:extLst>
-              </a:tr>
-              <a:tr h="370840">
-                <a:tc>
-                  <a:txBody>
-                    <a:bodyPr/>
-                    <a:lstStyle/>
-                    <a:p>
-                      <a:pPr algn="ctr"/>
-                      <a:r>
-                        <a:rPr lang="en-US" altLang="zh-TW" sz="2400" b="0" dirty="0">
-                          <a:solidFill>
-                            <a:schemeClr val="tx1"/>
-                          </a:solidFill>
-                          <a:latin typeface="Microsoft YaHei" panose="020B0503020204020204" pitchFamily="34" charset="-122"/>
-                          <a:ea typeface="Microsoft YaHei" panose="020B0503020204020204" pitchFamily="34" charset="-122"/>
-                        </a:rPr>
-                        <a:t>float</a:t>
-                      </a:r>
-                      <a:endParaRPr lang="zh-TW" altLang="en-US" sz="2400" b="0" dirty="0">
-                        <a:solidFill>
-                          <a:schemeClr val="tx1"/>
-                        </a:solidFill>
-                        <a:latin typeface="Microsoft YaHei" panose="020B0503020204020204" pitchFamily="34" charset="-122"/>
-                        <a:ea typeface="Microsoft YaHei" panose="020B0503020204020204" pitchFamily="34" charset="-122"/>
-                      </a:endParaRPr>
-                    </a:p>
-                  </a:txBody>
-                  <a:tcPr>
-                    <a:solidFill>
-                      <a:schemeClr val="bg1">
-                        <a:lumMod val="75000"/>
-                      </a:schemeClr>
-                    </a:solidFill>
-                  </a:tcPr>
-                </a:tc>
-                <a:tc>
-                  <a:txBody>
-                    <a:bodyPr/>
-                    <a:lstStyle/>
-                    <a:p>
-                      <a:pPr algn="ctr"/>
-                      <a:r>
-                        <a:rPr lang="zh-TW" altLang="en-US" sz="2400" b="0" dirty="0">
-                          <a:solidFill>
-                            <a:schemeClr val="tx1"/>
-                          </a:solidFill>
-                          <a:latin typeface="Microsoft YaHei" panose="020B0503020204020204" pitchFamily="34" charset="-122"/>
-                          <a:ea typeface="Microsoft YaHei" panose="020B0503020204020204" pitchFamily="34" charset="-122"/>
-                        </a:rPr>
-                        <a:t>浮點數</a:t>
-                      </a:r>
-                      <a:r>
-                        <a:rPr lang="en-US" altLang="zh-TW" sz="2400" b="0" dirty="0">
-                          <a:solidFill>
-                            <a:schemeClr val="tx1"/>
-                          </a:solidFill>
-                          <a:latin typeface="Microsoft YaHei" panose="020B0503020204020204" pitchFamily="34" charset="-122"/>
-                          <a:ea typeface="Microsoft YaHei" panose="020B0503020204020204" pitchFamily="34" charset="-122"/>
-                        </a:rPr>
-                        <a:t>1</a:t>
-                      </a:r>
-                      <a:r>
-                        <a:rPr lang="zh-TW" altLang="en-US" sz="2400" b="0" dirty="0">
-                          <a:solidFill>
-                            <a:schemeClr val="tx1"/>
-                          </a:solidFill>
-                          <a:latin typeface="Microsoft YaHei" panose="020B0503020204020204" pitchFamily="34" charset="-122"/>
-                          <a:ea typeface="Microsoft YaHei" panose="020B0503020204020204" pitchFamily="34" charset="-122"/>
-                        </a:rPr>
-                        <a:t>號</a:t>
-                      </a:r>
-                    </a:p>
-                  </a:txBody>
-                  <a:tcPr>
-                    <a:solidFill>
-                      <a:schemeClr val="bg1">
-                        <a:lumMod val="75000"/>
-                      </a:schemeClr>
-                    </a:solidFill>
-                  </a:tcPr>
-                </a:tc>
-                <a:tc>
-                  <a:txBody>
-                    <a:bodyPr/>
-                    <a:lstStyle/>
-                    <a:p>
-                      <a:pPr algn="ctr"/>
-                      <a:r>
-                        <a:rPr lang="en-US" altLang="zh-TW" sz="2400" b="0" dirty="0">
-                          <a:solidFill>
-                            <a:schemeClr val="tx1"/>
-                          </a:solidFill>
-                          <a:latin typeface="Microsoft YaHei" panose="020B0503020204020204" pitchFamily="34" charset="-122"/>
-                          <a:ea typeface="Microsoft YaHei" panose="020B0503020204020204" pitchFamily="34" charset="-122"/>
-                        </a:rPr>
-                        <a:t>10.567</a:t>
-                      </a:r>
-                      <a:endParaRPr lang="zh-TW" altLang="en-US" sz="2400" b="0" dirty="0">
-                        <a:solidFill>
-                          <a:schemeClr val="tx1"/>
-                        </a:solidFill>
-                        <a:latin typeface="Microsoft YaHei" panose="020B0503020204020204" pitchFamily="34" charset="-122"/>
-                        <a:ea typeface="Microsoft YaHei" panose="020B0503020204020204" pitchFamily="34" charset="-122"/>
-                      </a:endParaRPr>
-                    </a:p>
-                  </a:txBody>
-                  <a:tcPr>
-                    <a:solidFill>
-                      <a:schemeClr val="bg1">
-                        <a:lumMod val="75000"/>
-                      </a:schemeClr>
-                    </a:solidFill>
-                  </a:tcPr>
-                </a:tc>
-                <a:extLst>
-                  <a:ext uri="{0D108BD9-81ED-4DB2-BD59-A6C34878D82A}">
-                    <a16:rowId xmlns:a16="http://schemas.microsoft.com/office/drawing/2014/main" val="1372854998"/>
-                  </a:ext>
-                </a:extLst>
-              </a:tr>
-              <a:tr h="370840">
-                <a:tc>
-                  <a:txBody>
-                    <a:bodyPr/>
-                    <a:lstStyle/>
-                    <a:p>
-                      <a:pPr algn="ctr"/>
-                      <a:r>
-                        <a:rPr lang="en-US" altLang="zh-TW" sz="2400" b="0" dirty="0">
-                          <a:solidFill>
-                            <a:schemeClr val="tx1"/>
-                          </a:solidFill>
-                          <a:latin typeface="Microsoft YaHei" panose="020B0503020204020204" pitchFamily="34" charset="-122"/>
-                          <a:ea typeface="Microsoft YaHei" panose="020B0503020204020204" pitchFamily="34" charset="-122"/>
-                        </a:rPr>
-                        <a:t>string</a:t>
-                      </a:r>
-                      <a:endParaRPr lang="zh-TW" altLang="en-US" sz="2400" b="0" dirty="0">
-                        <a:solidFill>
-                          <a:schemeClr val="tx1"/>
-                        </a:solidFill>
-                        <a:latin typeface="Microsoft YaHei" panose="020B0503020204020204" pitchFamily="34" charset="-122"/>
-                        <a:ea typeface="Microsoft YaHei" panose="020B0503020204020204" pitchFamily="34" charset="-122"/>
-                      </a:endParaRPr>
-                    </a:p>
-                  </a:txBody>
-                  <a:tcPr>
-                    <a:solidFill>
-                      <a:schemeClr val="bg1">
-                        <a:lumMod val="75000"/>
-                      </a:schemeClr>
-                    </a:solidFill>
-                  </a:tcPr>
-                </a:tc>
-                <a:tc>
-                  <a:txBody>
-                    <a:bodyPr/>
-                    <a:lstStyle/>
-                    <a:p>
-                      <a:pPr algn="ctr"/>
-                      <a:r>
-                        <a:rPr lang="zh-TW" altLang="en-US" sz="2400" b="0" dirty="0">
-                          <a:solidFill>
-                            <a:schemeClr val="tx1"/>
-                          </a:solidFill>
-                          <a:latin typeface="Microsoft YaHei" panose="020B0503020204020204" pitchFamily="34" charset="-122"/>
-                          <a:ea typeface="Microsoft YaHei" panose="020B0503020204020204" pitchFamily="34" charset="-122"/>
-                        </a:rPr>
-                        <a:t>字串</a:t>
-                      </a:r>
-                      <a:r>
-                        <a:rPr lang="en-US" altLang="zh-TW" sz="2400" b="0" dirty="0">
-                          <a:solidFill>
-                            <a:schemeClr val="tx1"/>
-                          </a:solidFill>
-                          <a:latin typeface="Microsoft YaHei" panose="020B0503020204020204" pitchFamily="34" charset="-122"/>
-                          <a:ea typeface="Microsoft YaHei" panose="020B0503020204020204" pitchFamily="34" charset="-122"/>
-                        </a:rPr>
-                        <a:t>1</a:t>
-                      </a:r>
-                      <a:r>
-                        <a:rPr lang="zh-TW" altLang="en-US" sz="2400" b="0" dirty="0">
-                          <a:solidFill>
-                            <a:schemeClr val="tx1"/>
-                          </a:solidFill>
-                          <a:latin typeface="Microsoft YaHei" panose="020B0503020204020204" pitchFamily="34" charset="-122"/>
-                          <a:ea typeface="Microsoft YaHei" panose="020B0503020204020204" pitchFamily="34" charset="-122"/>
-                        </a:rPr>
-                        <a:t>號</a:t>
-                      </a:r>
-                    </a:p>
-                  </a:txBody>
-                  <a:tcPr>
-                    <a:solidFill>
-                      <a:schemeClr val="bg1">
-                        <a:lumMod val="75000"/>
-                      </a:schemeClr>
-                    </a:solidFill>
-                  </a:tcPr>
-                </a:tc>
-                <a:tc>
-                  <a:txBody>
-                    <a:bodyPr/>
-                    <a:lstStyle/>
-                    <a:p>
-                      <a:pPr algn="ctr"/>
-                      <a:r>
-                        <a:rPr lang="en-US" altLang="zh-TW" sz="2400" b="0" dirty="0">
-                          <a:solidFill>
-                            <a:schemeClr val="tx1"/>
-                          </a:solidFill>
-                          <a:latin typeface="Microsoft YaHei" panose="020B0503020204020204" pitchFamily="34" charset="-122"/>
-                          <a:ea typeface="Microsoft YaHei" panose="020B0503020204020204" pitchFamily="34" charset="-122"/>
-                        </a:rPr>
-                        <a:t>“hello”</a:t>
-                      </a:r>
-                      <a:endParaRPr lang="zh-TW" altLang="en-US" sz="2400" b="0" dirty="0">
-                        <a:solidFill>
-                          <a:schemeClr val="tx1"/>
-                        </a:solidFill>
-                        <a:latin typeface="Microsoft YaHei" panose="020B0503020204020204" pitchFamily="34" charset="-122"/>
-                        <a:ea typeface="Microsoft YaHei" panose="020B0503020204020204" pitchFamily="34" charset="-122"/>
-                      </a:endParaRPr>
-                    </a:p>
-                  </a:txBody>
-                  <a:tcPr>
-                    <a:solidFill>
-                      <a:schemeClr val="bg1">
-                        <a:lumMod val="75000"/>
-                      </a:schemeClr>
-                    </a:solidFill>
-                  </a:tcPr>
-                </a:tc>
-                <a:extLst>
-                  <a:ext uri="{0D108BD9-81ED-4DB2-BD59-A6C34878D82A}">
-                    <a16:rowId xmlns:a16="http://schemas.microsoft.com/office/drawing/2014/main" val="140849338"/>
-                  </a:ext>
-                </a:extLst>
-              </a:tr>
-              <a:tr h="370840">
-                <a:tc>
-                  <a:txBody>
-                    <a:bodyPr/>
-                    <a:lstStyle/>
-                    <a:p>
-                      <a:pPr algn="ctr"/>
-                      <a:r>
-                        <a:rPr lang="en-US" altLang="zh-TW" sz="2400" b="0" dirty="0">
-                          <a:solidFill>
-                            <a:schemeClr val="tx1"/>
-                          </a:solidFill>
-                          <a:latin typeface="Microsoft YaHei" panose="020B0503020204020204" pitchFamily="34" charset="-122"/>
-                          <a:ea typeface="Microsoft YaHei" panose="020B0503020204020204" pitchFamily="34" charset="-122"/>
-                        </a:rPr>
-                        <a:t>…</a:t>
-                      </a:r>
-                      <a:endParaRPr lang="zh-TW" altLang="en-US" sz="2400" b="0" dirty="0">
-                        <a:solidFill>
-                          <a:schemeClr val="tx1"/>
-                        </a:solidFill>
-                        <a:latin typeface="Microsoft YaHei" panose="020B0503020204020204" pitchFamily="34" charset="-122"/>
-                        <a:ea typeface="Microsoft YaHei" panose="020B0503020204020204" pitchFamily="34" charset="-122"/>
-                      </a:endParaRPr>
-                    </a:p>
-                  </a:txBody>
-                  <a:tcPr>
-                    <a:solidFill>
-                      <a:schemeClr val="bg1">
-                        <a:lumMod val="75000"/>
-                      </a:schemeClr>
-                    </a:solidFill>
-                  </a:tcPr>
-                </a:tc>
-                <a:tc>
-                  <a:txBody>
-                    <a:bodyPr/>
-                    <a:lstStyle/>
-                    <a:p>
-                      <a:pPr algn="ctr"/>
-                      <a:r>
-                        <a:rPr lang="en-US" altLang="zh-TW" sz="2400" b="0" dirty="0">
-                          <a:solidFill>
-                            <a:schemeClr val="tx1"/>
-                          </a:solidFill>
-                          <a:latin typeface="Microsoft YaHei" panose="020B0503020204020204" pitchFamily="34" charset="-122"/>
-                          <a:ea typeface="Microsoft YaHei" panose="020B0503020204020204" pitchFamily="34" charset="-122"/>
-                        </a:rPr>
-                        <a:t>…</a:t>
-                      </a:r>
-                      <a:endParaRPr lang="zh-TW" altLang="en-US" sz="2400" b="0" dirty="0">
-                        <a:solidFill>
-                          <a:schemeClr val="tx1"/>
-                        </a:solidFill>
-                        <a:latin typeface="Microsoft YaHei" panose="020B0503020204020204" pitchFamily="34" charset="-122"/>
-                        <a:ea typeface="Microsoft YaHei" panose="020B0503020204020204" pitchFamily="34" charset="-122"/>
-                      </a:endParaRPr>
-                    </a:p>
-                  </a:txBody>
-                  <a:tcPr>
-                    <a:solidFill>
-                      <a:schemeClr val="bg1">
-                        <a:lumMod val="75000"/>
-                      </a:schemeClr>
-                    </a:solidFill>
-                  </a:tcPr>
-                </a:tc>
-                <a:tc>
-                  <a:txBody>
-                    <a:bodyPr/>
-                    <a:lstStyle/>
-                    <a:p>
-                      <a:pPr algn="ctr"/>
-                      <a:r>
-                        <a:rPr lang="en-US" altLang="zh-TW" sz="2400" b="0" dirty="0">
-                          <a:solidFill>
-                            <a:schemeClr val="tx1"/>
-                          </a:solidFill>
-                          <a:latin typeface="Microsoft YaHei" panose="020B0503020204020204" pitchFamily="34" charset="-122"/>
-                          <a:ea typeface="Microsoft YaHei" panose="020B0503020204020204" pitchFamily="34" charset="-122"/>
-                        </a:rPr>
-                        <a:t>…</a:t>
-                      </a:r>
-                      <a:endParaRPr lang="zh-TW" altLang="en-US" sz="2400" b="0" dirty="0">
-                        <a:solidFill>
-                          <a:schemeClr val="tx1"/>
-                        </a:solidFill>
-                        <a:latin typeface="Microsoft YaHei" panose="020B0503020204020204" pitchFamily="34" charset="-122"/>
-                        <a:ea typeface="Microsoft YaHei" panose="020B0503020204020204" pitchFamily="34" charset="-122"/>
-                      </a:endParaRPr>
-                    </a:p>
-                  </a:txBody>
-                  <a:tcPr>
-                    <a:solidFill>
-                      <a:schemeClr val="bg1">
-                        <a:lumMod val="75000"/>
-                      </a:schemeClr>
-                    </a:solidFill>
-                  </a:tcPr>
-                </a:tc>
-                <a:extLst>
-                  <a:ext uri="{0D108BD9-81ED-4DB2-BD59-A6C34878D82A}">
-                    <a16:rowId xmlns:a16="http://schemas.microsoft.com/office/drawing/2014/main" val="3103123630"/>
-                  </a:ext>
-                </a:extLst>
-              </a:tr>
-              <a:tr h="370840">
-                <a:tc>
-                  <a:txBody>
-                    <a:bodyPr/>
-                    <a:lstStyle/>
-                    <a:p>
-                      <a:pPr algn="ctr"/>
-                      <a:r>
-                        <a:rPr lang="en-US" altLang="zh-TW" sz="2400" b="0" dirty="0" err="1">
-                          <a:solidFill>
-                            <a:schemeClr val="tx1"/>
-                          </a:solidFill>
-                          <a:latin typeface="Microsoft YaHei" panose="020B0503020204020204" pitchFamily="34" charset="-122"/>
-                          <a:ea typeface="Microsoft YaHei" panose="020B0503020204020204" pitchFamily="34" charset="-122"/>
-                        </a:rPr>
-                        <a:t>SomthingClass</a:t>
-                      </a:r>
-                      <a:endParaRPr lang="zh-TW" altLang="en-US" sz="2400" b="0" dirty="0">
-                        <a:solidFill>
-                          <a:schemeClr val="tx1"/>
-                        </a:solidFill>
-                        <a:latin typeface="Microsoft YaHei" panose="020B0503020204020204" pitchFamily="34" charset="-122"/>
-                        <a:ea typeface="Microsoft YaHei" panose="020B0503020204020204" pitchFamily="34" charset="-122"/>
-                      </a:endParaRPr>
-                    </a:p>
-                  </a:txBody>
-                  <a:tcPr>
-                    <a:solidFill>
-                      <a:schemeClr val="bg1">
-                        <a:lumMod val="75000"/>
-                      </a:schemeClr>
-                    </a:solidFill>
-                  </a:tcPr>
-                </a:tc>
-                <a:tc>
-                  <a:txBody>
-                    <a:bodyPr/>
-                    <a:lstStyle/>
-                    <a:p>
-                      <a:pPr algn="ctr"/>
-                      <a:r>
-                        <a:rPr lang="en-US" altLang="zh-TW" sz="2400" b="0" dirty="0">
-                          <a:solidFill>
-                            <a:schemeClr val="tx1"/>
-                          </a:solidFill>
-                          <a:latin typeface="Microsoft YaHei" panose="020B0503020204020204" pitchFamily="34" charset="-122"/>
-                          <a:ea typeface="Microsoft YaHei" panose="020B0503020204020204" pitchFamily="34" charset="-122"/>
-                        </a:rPr>
-                        <a:t>Object1</a:t>
-                      </a:r>
-                      <a:endParaRPr lang="zh-TW" altLang="en-US" sz="2400" b="0" dirty="0">
-                        <a:solidFill>
-                          <a:schemeClr val="tx1"/>
-                        </a:solidFill>
-                        <a:latin typeface="Microsoft YaHei" panose="020B0503020204020204" pitchFamily="34" charset="-122"/>
-                        <a:ea typeface="Microsoft YaHei" panose="020B0503020204020204" pitchFamily="34" charset="-122"/>
-                      </a:endParaRPr>
-                    </a:p>
-                  </a:txBody>
-                  <a:tcPr>
-                    <a:solidFill>
-                      <a:schemeClr val="bg1">
-                        <a:lumMod val="75000"/>
-                      </a:schemeClr>
-                    </a:solidFill>
-                  </a:tcPr>
-                </a:tc>
-                <a:tc>
-                  <a:txBody>
-                    <a:bodyPr/>
-                    <a:lstStyle/>
-                    <a:p>
-                      <a:pPr algn="ctr"/>
-                      <a:r>
-                        <a:rPr lang="en-US" altLang="zh-TW" sz="2400" b="0" dirty="0">
-                          <a:solidFill>
-                            <a:schemeClr val="tx1"/>
-                          </a:solidFill>
-                          <a:latin typeface="Microsoft YaHei" panose="020B0503020204020204" pitchFamily="34" charset="-122"/>
-                          <a:ea typeface="Microsoft YaHei" panose="020B0503020204020204" pitchFamily="34" charset="-122"/>
-                        </a:rPr>
-                        <a:t>Any Value</a:t>
-                      </a:r>
-                      <a:endParaRPr lang="zh-TW" altLang="en-US" sz="2400" b="0" dirty="0">
-                        <a:solidFill>
-                          <a:schemeClr val="tx1"/>
-                        </a:solidFill>
-                        <a:latin typeface="Microsoft YaHei" panose="020B0503020204020204" pitchFamily="34" charset="-122"/>
-                        <a:ea typeface="Microsoft YaHei" panose="020B0503020204020204" pitchFamily="34" charset="-122"/>
-                      </a:endParaRPr>
-                    </a:p>
-                  </a:txBody>
-                  <a:tcPr>
-                    <a:solidFill>
-                      <a:schemeClr val="bg1">
-                        <a:lumMod val="75000"/>
-                      </a:schemeClr>
-                    </a:solidFill>
-                  </a:tcPr>
-                </a:tc>
-                <a:extLst>
-                  <a:ext uri="{0D108BD9-81ED-4DB2-BD59-A6C34878D82A}">
-                    <a16:rowId xmlns:a16="http://schemas.microsoft.com/office/drawing/2014/main" val="2034320953"/>
-                  </a:ext>
-                </a:extLst>
-              </a:tr>
-            </a:tbl>
-          </a:graphicData>
-        </a:graphic>
-      </p:graphicFrame>
-      <p:sp>
-        <p:nvSpPr>
-          <p:cNvPr id="4" name="矩形 3">
-            <a:extLst>
-              <a:ext uri="{FF2B5EF4-FFF2-40B4-BE49-F238E27FC236}">
-                <a16:creationId xmlns:a16="http://schemas.microsoft.com/office/drawing/2014/main" id="{6D911C7B-EF14-4684-961B-37237400F15D}"/>
-              </a:ext>
-            </a:extLst>
-          </p:cNvPr>
-          <p:cNvSpPr/>
-          <p:nvPr/>
-        </p:nvSpPr>
-        <p:spPr>
-          <a:xfrm>
-            <a:off x="1847461" y="4037429"/>
-            <a:ext cx="8647923" cy="2684046"/>
-          </a:xfrm>
-          <a:prstGeom prst="rect">
-            <a:avLst/>
-          </a:prstGeom>
-        </p:spPr>
-        <p:style>
-          <a:lnRef idx="2">
-            <a:schemeClr val="dk1">
-              <a:shade val="50000"/>
-            </a:schemeClr>
-          </a:lnRef>
-          <a:fillRef idx="1">
-            <a:schemeClr val="dk1"/>
-          </a:fillRef>
-          <a:effectRef idx="0">
-            <a:schemeClr val="dk1"/>
-          </a:effectRef>
-          <a:fontRef idx="minor">
-            <a:schemeClr val="lt1"/>
-          </a:fontRef>
-        </p:style>
-        <p:txBody>
-          <a:bodyPr rtlCol="0" anchor="ctr"/>
-          <a:lstStyle/>
-          <a:p>
-            <a:pPr algn="ctr"/>
-            <a:r>
-              <a:rPr lang="en-US" altLang="zh-TW" sz="2800" dirty="0"/>
-              <a:t>A =</a:t>
-            </a:r>
-            <a:r>
-              <a:rPr lang="zh-TW" altLang="en-US" sz="2800" dirty="0"/>
-              <a:t> </a:t>
-            </a:r>
-            <a:r>
-              <a:rPr lang="en-US" altLang="zh-TW" sz="2800" dirty="0"/>
-              <a:t>10</a:t>
-            </a:r>
-          </a:p>
-          <a:p>
-            <a:pPr algn="ctr"/>
-            <a:r>
-              <a:rPr lang="en-US" altLang="zh-TW" sz="2800" dirty="0"/>
-              <a:t>B = 10.567</a:t>
-            </a:r>
-          </a:p>
-          <a:p>
-            <a:pPr algn="ctr"/>
-            <a:r>
-              <a:rPr lang="en-US" altLang="zh-TW" sz="2800" dirty="0"/>
-              <a:t>C = “hello”</a:t>
-            </a:r>
-          </a:p>
-          <a:p>
-            <a:pPr algn="ctr"/>
-            <a:r>
-              <a:rPr lang="en-US" altLang="zh-TW" sz="2800" dirty="0"/>
-              <a:t>…</a:t>
-            </a:r>
-          </a:p>
-        </p:txBody>
-      </p:sp>
-    </p:spTree>
-    <p:extLst>
-      <p:ext uri="{BB962C8B-B14F-4D97-AF65-F5344CB8AC3E}">
-        <p14:creationId xmlns:p14="http://schemas.microsoft.com/office/powerpoint/2010/main" val="2692799197"/>
       </p:ext>
     </p:extLst>
   </p:cSld>

</xml_diff>